<commit_message>
First round project corrections
</commit_message>
<xml_diff>
--- a/Presentation/Presentation.pptx
+++ b/Presentation/Presentation.pptx
@@ -4,14 +4,19 @@
   <p:sldMasterIdLst>
     <p:sldMasterId id="2147483732" r:id="rId1"/>
   </p:sldMasterIdLst>
+  <p:notesMasterIdLst>
+    <p:notesMasterId r:id="rId11"/>
+  </p:notesMasterIdLst>
   <p:sldIdLst>
     <p:sldId id="256" r:id="rId2"/>
     <p:sldId id="257" r:id="rId3"/>
     <p:sldId id="258" r:id="rId4"/>
-    <p:sldId id="259" r:id="rId5"/>
-    <p:sldId id="260" r:id="rId6"/>
-    <p:sldId id="261" r:id="rId7"/>
-    <p:sldId id="264" r:id="rId8"/>
+    <p:sldId id="267" r:id="rId5"/>
+    <p:sldId id="266" r:id="rId6"/>
+    <p:sldId id="259" r:id="rId7"/>
+    <p:sldId id="260" r:id="rId8"/>
+    <p:sldId id="261" r:id="rId9"/>
+    <p:sldId id="264" r:id="rId10"/>
   </p:sldIdLst>
   <p:sldSz cx="12192000" cy="6858000"/>
   <p:notesSz cx="6858000" cy="9144000"/>
@@ -118,6 +123,623 @@
 </p:presentation>
 </file>
 
+<file path=ppt/notesMasters/notesMaster1.xml><?xml version="1.0" encoding="utf-8"?>
+<p:notesMaster xmlns:a="http://schemas.openxmlformats.org/drawingml/2006/main" xmlns:r="http://schemas.openxmlformats.org/officeDocument/2006/relationships" xmlns:p="http://schemas.openxmlformats.org/presentationml/2006/main">
+  <p:cSld>
+    <p:bg>
+      <p:bgRef idx="1001">
+        <a:schemeClr val="bg1"/>
+      </p:bgRef>
+    </p:bg>
+    <p:spTree>
+      <p:nvGrpSpPr>
+        <p:cNvPr id="1" name=""/>
+        <p:cNvGrpSpPr/>
+        <p:nvPr/>
+      </p:nvGrpSpPr>
+      <p:grpSpPr>
+        <a:xfrm>
+          <a:off x="0" y="0"/>
+          <a:ext cx="0" cy="0"/>
+          <a:chOff x="0" y="0"/>
+          <a:chExt cx="0" cy="0"/>
+        </a:xfrm>
+      </p:grpSpPr>
+      <p:sp>
+        <p:nvSpPr>
+          <p:cNvPr id="2" name="Header Placeholder 1"/>
+          <p:cNvSpPr>
+            <a:spLocks noGrp="1"/>
+          </p:cNvSpPr>
+          <p:nvPr>
+            <p:ph type="hdr" sz="quarter"/>
+          </p:nvPr>
+        </p:nvSpPr>
+        <p:spPr>
+          <a:xfrm>
+            <a:off x="0" y="0"/>
+            <a:ext cx="2971800" cy="458788"/>
+          </a:xfrm>
+          <a:prstGeom prst="rect">
+            <a:avLst/>
+          </a:prstGeom>
+        </p:spPr>
+        <p:txBody>
+          <a:bodyPr vert="horz" lIns="91440" tIns="45720" rIns="91440" bIns="45720" rtlCol="0"/>
+          <a:lstStyle>
+            <a:lvl1pPr algn="l">
+              <a:defRPr sz="1200"/>
+            </a:lvl1pPr>
+          </a:lstStyle>
+          <a:p>
+            <a:endParaRPr lang="en-US"/>
+          </a:p>
+        </p:txBody>
+      </p:sp>
+      <p:sp>
+        <p:nvSpPr>
+          <p:cNvPr id="3" name="Date Placeholder 2"/>
+          <p:cNvSpPr>
+            <a:spLocks noGrp="1"/>
+          </p:cNvSpPr>
+          <p:nvPr>
+            <p:ph type="dt" idx="1"/>
+          </p:nvPr>
+        </p:nvSpPr>
+        <p:spPr>
+          <a:xfrm>
+            <a:off x="3884613" y="0"/>
+            <a:ext cx="2971800" cy="458788"/>
+          </a:xfrm>
+          <a:prstGeom prst="rect">
+            <a:avLst/>
+          </a:prstGeom>
+        </p:spPr>
+        <p:txBody>
+          <a:bodyPr vert="horz" lIns="91440" tIns="45720" rIns="91440" bIns="45720" rtlCol="0"/>
+          <a:lstStyle>
+            <a:lvl1pPr algn="r">
+              <a:defRPr sz="1200"/>
+            </a:lvl1pPr>
+          </a:lstStyle>
+          <a:p>
+            <a:fld id="{43ED6E17-E11D-A343-9986-A8209C37F2E4}" type="datetimeFigureOut">
+              <a:rPr lang="en-US" smtClean="0"/>
+              <a:t>11/16/23</a:t>
+            </a:fld>
+            <a:endParaRPr lang="en-US"/>
+          </a:p>
+        </p:txBody>
+      </p:sp>
+      <p:sp>
+        <p:nvSpPr>
+          <p:cNvPr id="4" name="Slide Image Placeholder 3"/>
+          <p:cNvSpPr>
+            <a:spLocks noGrp="1" noRot="1" noChangeAspect="1"/>
+          </p:cNvSpPr>
+          <p:nvPr>
+            <p:ph type="sldImg" idx="2"/>
+          </p:nvPr>
+        </p:nvSpPr>
+        <p:spPr>
+          <a:xfrm>
+            <a:off x="685800" y="1143000"/>
+            <a:ext cx="5486400" cy="3086100"/>
+          </a:xfrm>
+          <a:prstGeom prst="rect">
+            <a:avLst/>
+          </a:prstGeom>
+          <a:noFill/>
+          <a:ln w="12700">
+            <a:solidFill>
+              <a:prstClr val="black"/>
+            </a:solidFill>
+          </a:ln>
+        </p:spPr>
+        <p:txBody>
+          <a:bodyPr vert="horz" lIns="91440" tIns="45720" rIns="91440" bIns="45720" rtlCol="0" anchor="ctr"/>
+          <a:lstStyle/>
+          <a:p>
+            <a:endParaRPr lang="en-US"/>
+          </a:p>
+        </p:txBody>
+      </p:sp>
+      <p:sp>
+        <p:nvSpPr>
+          <p:cNvPr id="5" name="Notes Placeholder 4"/>
+          <p:cNvSpPr>
+            <a:spLocks noGrp="1"/>
+          </p:cNvSpPr>
+          <p:nvPr>
+            <p:ph type="body" sz="quarter" idx="3"/>
+          </p:nvPr>
+        </p:nvSpPr>
+        <p:spPr>
+          <a:xfrm>
+            <a:off x="685800" y="4400550"/>
+            <a:ext cx="5486400" cy="3600450"/>
+          </a:xfrm>
+          <a:prstGeom prst="rect">
+            <a:avLst/>
+          </a:prstGeom>
+        </p:spPr>
+        <p:txBody>
+          <a:bodyPr vert="horz" lIns="91440" tIns="45720" rIns="91440" bIns="45720" rtlCol="0"/>
+          <a:lstStyle/>
+          <a:p>
+            <a:pPr lvl="0"/>
+            <a:r>
+              <a:rPr lang="en-US"/>
+              <a:t>Click to edit Master text styles</a:t>
+            </a:r>
+          </a:p>
+          <a:p>
+            <a:pPr lvl="1"/>
+            <a:r>
+              <a:rPr lang="en-US"/>
+              <a:t>Second level</a:t>
+            </a:r>
+          </a:p>
+          <a:p>
+            <a:pPr lvl="2"/>
+            <a:r>
+              <a:rPr lang="en-US"/>
+              <a:t>Third level</a:t>
+            </a:r>
+          </a:p>
+          <a:p>
+            <a:pPr lvl="3"/>
+            <a:r>
+              <a:rPr lang="en-US"/>
+              <a:t>Fourth level</a:t>
+            </a:r>
+          </a:p>
+          <a:p>
+            <a:pPr lvl="4"/>
+            <a:r>
+              <a:rPr lang="en-US"/>
+              <a:t>Fifth level</a:t>
+            </a:r>
+          </a:p>
+        </p:txBody>
+      </p:sp>
+      <p:sp>
+        <p:nvSpPr>
+          <p:cNvPr id="6" name="Footer Placeholder 5"/>
+          <p:cNvSpPr>
+            <a:spLocks noGrp="1"/>
+          </p:cNvSpPr>
+          <p:nvPr>
+            <p:ph type="ftr" sz="quarter" idx="4"/>
+          </p:nvPr>
+        </p:nvSpPr>
+        <p:spPr>
+          <a:xfrm>
+            <a:off x="0" y="8685213"/>
+            <a:ext cx="2971800" cy="458787"/>
+          </a:xfrm>
+          <a:prstGeom prst="rect">
+            <a:avLst/>
+          </a:prstGeom>
+        </p:spPr>
+        <p:txBody>
+          <a:bodyPr vert="horz" lIns="91440" tIns="45720" rIns="91440" bIns="45720" rtlCol="0" anchor="b"/>
+          <a:lstStyle>
+            <a:lvl1pPr algn="l">
+              <a:defRPr sz="1200"/>
+            </a:lvl1pPr>
+          </a:lstStyle>
+          <a:p>
+            <a:endParaRPr lang="en-US"/>
+          </a:p>
+        </p:txBody>
+      </p:sp>
+      <p:sp>
+        <p:nvSpPr>
+          <p:cNvPr id="7" name="Slide Number Placeholder 6"/>
+          <p:cNvSpPr>
+            <a:spLocks noGrp="1"/>
+          </p:cNvSpPr>
+          <p:nvPr>
+            <p:ph type="sldNum" sz="quarter" idx="5"/>
+          </p:nvPr>
+        </p:nvSpPr>
+        <p:spPr>
+          <a:xfrm>
+            <a:off x="3884613" y="8685213"/>
+            <a:ext cx="2971800" cy="458787"/>
+          </a:xfrm>
+          <a:prstGeom prst="rect">
+            <a:avLst/>
+          </a:prstGeom>
+        </p:spPr>
+        <p:txBody>
+          <a:bodyPr vert="horz" lIns="91440" tIns="45720" rIns="91440" bIns="45720" rtlCol="0" anchor="b"/>
+          <a:lstStyle>
+            <a:lvl1pPr algn="r">
+              <a:defRPr sz="1200"/>
+            </a:lvl1pPr>
+          </a:lstStyle>
+          <a:p>
+            <a:fld id="{8E0C772F-3280-2149-AC88-EF585DB063B5}" type="slidenum">
+              <a:rPr lang="en-US" smtClean="0"/>
+              <a:t>‹#›</a:t>
+            </a:fld>
+            <a:endParaRPr lang="en-US"/>
+          </a:p>
+        </p:txBody>
+      </p:sp>
+    </p:spTree>
+    <p:extLst>
+      <p:ext uri="{BB962C8B-B14F-4D97-AF65-F5344CB8AC3E}">
+        <p14:creationId xmlns:p14="http://schemas.microsoft.com/office/powerpoint/2010/main" val="786286497"/>
+      </p:ext>
+    </p:extLst>
+  </p:cSld>
+  <p:clrMap bg1="lt1" tx1="dk1" bg2="lt2" tx2="dk2" accent1="accent1" accent2="accent2" accent3="accent3" accent4="accent4" accent5="accent5" accent6="accent6" hlink="hlink" folHlink="folHlink"/>
+  <p:notesStyle>
+    <a:lvl1pPr marL="0" algn="l" defTabSz="914400" rtl="0" eaLnBrk="1" latinLnBrk="0" hangingPunct="1">
+      <a:defRPr sz="1200" kern="1200">
+        <a:solidFill>
+          <a:schemeClr val="tx1"/>
+        </a:solidFill>
+        <a:latin typeface="+mn-lt"/>
+        <a:ea typeface="+mn-ea"/>
+        <a:cs typeface="+mn-cs"/>
+      </a:defRPr>
+    </a:lvl1pPr>
+    <a:lvl2pPr marL="457200" algn="l" defTabSz="914400" rtl="0" eaLnBrk="1" latinLnBrk="0" hangingPunct="1">
+      <a:defRPr sz="1200" kern="1200">
+        <a:solidFill>
+          <a:schemeClr val="tx1"/>
+        </a:solidFill>
+        <a:latin typeface="+mn-lt"/>
+        <a:ea typeface="+mn-ea"/>
+        <a:cs typeface="+mn-cs"/>
+      </a:defRPr>
+    </a:lvl2pPr>
+    <a:lvl3pPr marL="914400" algn="l" defTabSz="914400" rtl="0" eaLnBrk="1" latinLnBrk="0" hangingPunct="1">
+      <a:defRPr sz="1200" kern="1200">
+        <a:solidFill>
+          <a:schemeClr val="tx1"/>
+        </a:solidFill>
+        <a:latin typeface="+mn-lt"/>
+        <a:ea typeface="+mn-ea"/>
+        <a:cs typeface="+mn-cs"/>
+      </a:defRPr>
+    </a:lvl3pPr>
+    <a:lvl4pPr marL="1371600" algn="l" defTabSz="914400" rtl="0" eaLnBrk="1" latinLnBrk="0" hangingPunct="1">
+      <a:defRPr sz="1200" kern="1200">
+        <a:solidFill>
+          <a:schemeClr val="tx1"/>
+        </a:solidFill>
+        <a:latin typeface="+mn-lt"/>
+        <a:ea typeface="+mn-ea"/>
+        <a:cs typeface="+mn-cs"/>
+      </a:defRPr>
+    </a:lvl4pPr>
+    <a:lvl5pPr marL="1828800" algn="l" defTabSz="914400" rtl="0" eaLnBrk="1" latinLnBrk="0" hangingPunct="1">
+      <a:defRPr sz="1200" kern="1200">
+        <a:solidFill>
+          <a:schemeClr val="tx1"/>
+        </a:solidFill>
+        <a:latin typeface="+mn-lt"/>
+        <a:ea typeface="+mn-ea"/>
+        <a:cs typeface="+mn-cs"/>
+      </a:defRPr>
+    </a:lvl5pPr>
+    <a:lvl6pPr marL="2286000" algn="l" defTabSz="914400" rtl="0" eaLnBrk="1" latinLnBrk="0" hangingPunct="1">
+      <a:defRPr sz="1200" kern="1200">
+        <a:solidFill>
+          <a:schemeClr val="tx1"/>
+        </a:solidFill>
+        <a:latin typeface="+mn-lt"/>
+        <a:ea typeface="+mn-ea"/>
+        <a:cs typeface="+mn-cs"/>
+      </a:defRPr>
+    </a:lvl6pPr>
+    <a:lvl7pPr marL="2743200" algn="l" defTabSz="914400" rtl="0" eaLnBrk="1" latinLnBrk="0" hangingPunct="1">
+      <a:defRPr sz="1200" kern="1200">
+        <a:solidFill>
+          <a:schemeClr val="tx1"/>
+        </a:solidFill>
+        <a:latin typeface="+mn-lt"/>
+        <a:ea typeface="+mn-ea"/>
+        <a:cs typeface="+mn-cs"/>
+      </a:defRPr>
+    </a:lvl7pPr>
+    <a:lvl8pPr marL="3200400" algn="l" defTabSz="914400" rtl="0" eaLnBrk="1" latinLnBrk="0" hangingPunct="1">
+      <a:defRPr sz="1200" kern="1200">
+        <a:solidFill>
+          <a:schemeClr val="tx1"/>
+        </a:solidFill>
+        <a:latin typeface="+mn-lt"/>
+        <a:ea typeface="+mn-ea"/>
+        <a:cs typeface="+mn-cs"/>
+      </a:defRPr>
+    </a:lvl8pPr>
+    <a:lvl9pPr marL="3657600" algn="l" defTabSz="914400" rtl="0" eaLnBrk="1" latinLnBrk="0" hangingPunct="1">
+      <a:defRPr sz="1200" kern="1200">
+        <a:solidFill>
+          <a:schemeClr val="tx1"/>
+        </a:solidFill>
+        <a:latin typeface="+mn-lt"/>
+        <a:ea typeface="+mn-ea"/>
+        <a:cs typeface="+mn-cs"/>
+      </a:defRPr>
+    </a:lvl9pPr>
+  </p:notesStyle>
+</p:notesMaster>
+</file>
+
+<file path=ppt/notesSlides/notesSlide1.xml><?xml version="1.0" encoding="utf-8"?>
+<p:notes xmlns:a="http://schemas.openxmlformats.org/drawingml/2006/main" xmlns:r="http://schemas.openxmlformats.org/officeDocument/2006/relationships" xmlns:p="http://schemas.openxmlformats.org/presentationml/2006/main">
+  <p:cSld>
+    <p:spTree>
+      <p:nvGrpSpPr>
+        <p:cNvPr id="1" name=""/>
+        <p:cNvGrpSpPr/>
+        <p:nvPr/>
+      </p:nvGrpSpPr>
+      <p:grpSpPr>
+        <a:xfrm>
+          <a:off x="0" y="0"/>
+          <a:ext cx="0" cy="0"/>
+          <a:chOff x="0" y="0"/>
+          <a:chExt cx="0" cy="0"/>
+        </a:xfrm>
+      </p:grpSpPr>
+      <p:sp>
+        <p:nvSpPr>
+          <p:cNvPr id="2" name="Slide Image Placeholder 1"/>
+          <p:cNvSpPr>
+            <a:spLocks noGrp="1" noRot="1" noChangeAspect="1"/>
+          </p:cNvSpPr>
+          <p:nvPr>
+            <p:ph type="sldImg"/>
+          </p:nvPr>
+        </p:nvSpPr>
+        <p:spPr/>
+      </p:sp>
+      <p:sp>
+        <p:nvSpPr>
+          <p:cNvPr id="3" name="Notes Placeholder 2"/>
+          <p:cNvSpPr>
+            <a:spLocks noGrp="1"/>
+          </p:cNvSpPr>
+          <p:nvPr>
+            <p:ph type="body" idx="1"/>
+          </p:nvPr>
+        </p:nvSpPr>
+        <p:spPr/>
+        <p:txBody>
+          <a:bodyPr/>
+          <a:lstStyle/>
+          <a:p>
+            <a:r>
+              <a:rPr lang="en-US" dirty="0"/>
+              <a:t>Talk more about stakeholders</a:t>
+            </a:r>
+          </a:p>
+          <a:p>
+            <a:endParaRPr lang="en-US" dirty="0"/>
+          </a:p>
+          <a:p>
+            <a:r>
+              <a:rPr lang="en-US" dirty="0"/>
+              <a:t>Stakeholder is hospital executives. What’s their goal and business objective?</a:t>
+            </a:r>
+          </a:p>
+          <a:p>
+            <a:endParaRPr lang="en-US" dirty="0"/>
+          </a:p>
+          <a:p>
+            <a:r>
+              <a:rPr lang="en-US" dirty="0"/>
+              <a:t>Goal is too identify pneumonia from x-rays</a:t>
+            </a:r>
+          </a:p>
+          <a:p>
+            <a:endParaRPr lang="en-US" dirty="0"/>
+          </a:p>
+          <a:p>
+            <a:pPr marL="0" marR="0" lvl="0" indent="0" algn="l" defTabSz="914400" rtl="0" eaLnBrk="1" fontAlgn="auto" latinLnBrk="0" hangingPunct="1">
+              <a:lnSpc>
+                <a:spcPct val="100000"/>
+              </a:lnSpc>
+              <a:spcBef>
+                <a:spcPts val="0"/>
+              </a:spcBef>
+              <a:spcAft>
+                <a:spcPts val="0"/>
+              </a:spcAft>
+              <a:buClrTx/>
+              <a:buSzTx/>
+              <a:buFontTx/>
+              <a:buNone/>
+              <a:tabLst/>
+              <a:defRPr/>
+            </a:pPr>
+            <a:r>
+              <a:rPr lang="en-US" dirty="0"/>
+              <a:t>In the US alone,1 million people are hospitalized and 50,000 die every year.</a:t>
+            </a:r>
+          </a:p>
+          <a:p>
+            <a:endParaRPr lang="en-US" dirty="0"/>
+          </a:p>
+        </p:txBody>
+      </p:sp>
+      <p:sp>
+        <p:nvSpPr>
+          <p:cNvPr id="4" name="Slide Number Placeholder 3"/>
+          <p:cNvSpPr>
+            <a:spLocks noGrp="1"/>
+          </p:cNvSpPr>
+          <p:nvPr>
+            <p:ph type="sldNum" sz="quarter" idx="5"/>
+          </p:nvPr>
+        </p:nvSpPr>
+        <p:spPr/>
+        <p:txBody>
+          <a:bodyPr/>
+          <a:lstStyle/>
+          <a:p>
+            <a:fld id="{8E0C772F-3280-2149-AC88-EF585DB063B5}" type="slidenum">
+              <a:rPr lang="en-US" smtClean="0"/>
+              <a:t>2</a:t>
+            </a:fld>
+            <a:endParaRPr lang="en-US"/>
+          </a:p>
+        </p:txBody>
+      </p:sp>
+    </p:spTree>
+    <p:extLst>
+      <p:ext uri="{BB962C8B-B14F-4D97-AF65-F5344CB8AC3E}">
+        <p14:creationId xmlns:p14="http://schemas.microsoft.com/office/powerpoint/2010/main" val="1873666781"/>
+      </p:ext>
+    </p:extLst>
+  </p:cSld>
+  <p:clrMapOvr>
+    <a:masterClrMapping/>
+  </p:clrMapOvr>
+</p:notes>
+</file>
+
+<file path=ppt/notesSlides/notesSlide2.xml><?xml version="1.0" encoding="utf-8"?>
+<p:notes xmlns:a="http://schemas.openxmlformats.org/drawingml/2006/main" xmlns:r="http://schemas.openxmlformats.org/officeDocument/2006/relationships" xmlns:p="http://schemas.openxmlformats.org/presentationml/2006/main">
+  <p:cSld>
+    <p:spTree>
+      <p:nvGrpSpPr>
+        <p:cNvPr id="1" name=""/>
+        <p:cNvGrpSpPr/>
+        <p:nvPr/>
+      </p:nvGrpSpPr>
+      <p:grpSpPr>
+        <a:xfrm>
+          <a:off x="0" y="0"/>
+          <a:ext cx="0" cy="0"/>
+          <a:chOff x="0" y="0"/>
+          <a:chExt cx="0" cy="0"/>
+        </a:xfrm>
+      </p:grpSpPr>
+      <p:sp>
+        <p:nvSpPr>
+          <p:cNvPr id="2" name="Slide Image Placeholder 1"/>
+          <p:cNvSpPr>
+            <a:spLocks noGrp="1" noRot="1" noChangeAspect="1"/>
+          </p:cNvSpPr>
+          <p:nvPr>
+            <p:ph type="sldImg"/>
+          </p:nvPr>
+        </p:nvSpPr>
+        <p:spPr/>
+      </p:sp>
+      <p:sp>
+        <p:nvSpPr>
+          <p:cNvPr id="3" name="Notes Placeholder 2"/>
+          <p:cNvSpPr>
+            <a:spLocks noGrp="1"/>
+          </p:cNvSpPr>
+          <p:nvPr>
+            <p:ph type="body" idx="1"/>
+          </p:nvPr>
+        </p:nvSpPr>
+        <p:spPr/>
+        <p:txBody>
+          <a:bodyPr/>
+          <a:lstStyle/>
+          <a:p>
+            <a:r>
+              <a:rPr lang="en-US" dirty="0"/>
+              <a:t>Talk more about stakeholders</a:t>
+            </a:r>
+          </a:p>
+          <a:p>
+            <a:endParaRPr lang="en-US" dirty="0"/>
+          </a:p>
+          <a:p>
+            <a:r>
+              <a:rPr lang="en-US" dirty="0"/>
+              <a:t>Stakeholder is hospital executives. What’s their goal and business objective?</a:t>
+            </a:r>
+          </a:p>
+          <a:p>
+            <a:endParaRPr lang="en-US" dirty="0"/>
+          </a:p>
+          <a:p>
+            <a:r>
+              <a:rPr lang="en-US" dirty="0"/>
+              <a:t>Goal is too identify pneumonia from x-rays</a:t>
+            </a:r>
+          </a:p>
+          <a:p>
+            <a:endParaRPr lang="en-US" dirty="0"/>
+          </a:p>
+          <a:p>
+            <a:pPr marL="0" marR="0" lvl="0" indent="0" algn="l" defTabSz="914400" rtl="0" eaLnBrk="1" fontAlgn="auto" latinLnBrk="0" hangingPunct="1">
+              <a:lnSpc>
+                <a:spcPct val="100000"/>
+              </a:lnSpc>
+              <a:spcBef>
+                <a:spcPts val="0"/>
+              </a:spcBef>
+              <a:spcAft>
+                <a:spcPts val="0"/>
+              </a:spcAft>
+              <a:buClrTx/>
+              <a:buSzTx/>
+              <a:buFontTx/>
+              <a:buNone/>
+              <a:tabLst/>
+              <a:defRPr/>
+            </a:pPr>
+            <a:r>
+              <a:rPr lang="en-US" dirty="0"/>
+              <a:t>In the US alone,1 million people are hospitalized and 50,000 die every year.</a:t>
+            </a:r>
+          </a:p>
+          <a:p>
+            <a:endParaRPr lang="en-US" dirty="0"/>
+          </a:p>
+        </p:txBody>
+      </p:sp>
+      <p:sp>
+        <p:nvSpPr>
+          <p:cNvPr id="4" name="Slide Number Placeholder 3"/>
+          <p:cNvSpPr>
+            <a:spLocks noGrp="1"/>
+          </p:cNvSpPr>
+          <p:nvPr>
+            <p:ph type="sldNum" sz="quarter" idx="5"/>
+          </p:nvPr>
+        </p:nvSpPr>
+        <p:spPr/>
+        <p:txBody>
+          <a:bodyPr/>
+          <a:lstStyle/>
+          <a:p>
+            <a:fld id="{8E0C772F-3280-2149-AC88-EF585DB063B5}" type="slidenum">
+              <a:rPr lang="en-US" smtClean="0"/>
+              <a:t>5</a:t>
+            </a:fld>
+            <a:endParaRPr lang="en-US"/>
+          </a:p>
+        </p:txBody>
+      </p:sp>
+    </p:spTree>
+    <p:extLst>
+      <p:ext uri="{BB962C8B-B14F-4D97-AF65-F5344CB8AC3E}">
+        <p14:creationId xmlns:p14="http://schemas.microsoft.com/office/powerpoint/2010/main" val="803713896"/>
+      </p:ext>
+    </p:extLst>
+  </p:cSld>
+  <p:clrMapOvr>
+    <a:masterClrMapping/>
+  </p:clrMapOvr>
+</p:notes>
+</file>
+
 <file path=ppt/slideLayouts/slideLayout1.xml><?xml version="1.0" encoding="utf-8"?>
 <p:sldLayout xmlns:a="http://schemas.openxmlformats.org/drawingml/2006/main" xmlns:r="http://schemas.openxmlformats.org/officeDocument/2006/relationships" xmlns:p="http://schemas.openxmlformats.org/presentationml/2006/main" type="title" preserve="1">
   <p:cSld name="Title Slide">
@@ -281,7 +903,7 @@
           <a:p>
             <a:fld id="{C245FD1E-F56D-0E4D-8B29-731D998991B5}" type="datetimeFigureOut">
               <a:rPr lang="en-US" smtClean="0"/>
-              <a:t>11/2/23</a:t>
+              <a:t>11/16/23</a:t>
             </a:fld>
             <a:endParaRPr lang="en-US"/>
           </a:p>
@@ -451,7 +1073,7 @@
           <a:p>
             <a:fld id="{C245FD1E-F56D-0E4D-8B29-731D998991B5}" type="datetimeFigureOut">
               <a:rPr lang="en-US" smtClean="0"/>
-              <a:t>11/2/23</a:t>
+              <a:t>11/16/23</a:t>
             </a:fld>
             <a:endParaRPr lang="en-US"/>
           </a:p>
@@ -631,7 +1253,7 @@
           <a:p>
             <a:fld id="{C245FD1E-F56D-0E4D-8B29-731D998991B5}" type="datetimeFigureOut">
               <a:rPr lang="en-US" smtClean="0"/>
-              <a:t>11/2/23</a:t>
+              <a:t>11/16/23</a:t>
             </a:fld>
             <a:endParaRPr lang="en-US"/>
           </a:p>
@@ -801,7 +1423,7 @@
           <a:p>
             <a:fld id="{C245FD1E-F56D-0E4D-8B29-731D998991B5}" type="datetimeFigureOut">
               <a:rPr lang="en-US" smtClean="0"/>
-              <a:t>11/2/23</a:t>
+              <a:t>11/16/23</a:t>
             </a:fld>
             <a:endParaRPr lang="en-US"/>
           </a:p>
@@ -1069,7 +1691,7 @@
           <a:p>
             <a:fld id="{C245FD1E-F56D-0E4D-8B29-731D998991B5}" type="datetimeFigureOut">
               <a:rPr lang="en-US" smtClean="0"/>
-              <a:t>11/2/23</a:t>
+              <a:t>11/16/23</a:t>
             </a:fld>
             <a:endParaRPr lang="en-US"/>
           </a:p>
@@ -1301,7 +1923,7 @@
           <a:p>
             <a:fld id="{C245FD1E-F56D-0E4D-8B29-731D998991B5}" type="datetimeFigureOut">
               <a:rPr lang="en-US" smtClean="0"/>
-              <a:t>11/2/23</a:t>
+              <a:t>11/16/23</a:t>
             </a:fld>
             <a:endParaRPr lang="en-US"/>
           </a:p>
@@ -1660,7 +2282,7 @@
           <a:p>
             <a:fld id="{C245FD1E-F56D-0E4D-8B29-731D998991B5}" type="datetimeFigureOut">
               <a:rPr lang="en-US" smtClean="0"/>
-              <a:t>11/2/23</a:t>
+              <a:t>11/16/23</a:t>
             </a:fld>
             <a:endParaRPr lang="en-US"/>
           </a:p>
@@ -1801,7 +2423,7 @@
           <a:p>
             <a:fld id="{C245FD1E-F56D-0E4D-8B29-731D998991B5}" type="datetimeFigureOut">
               <a:rPr lang="en-US" smtClean="0"/>
-              <a:t>11/2/23</a:t>
+              <a:t>11/16/23</a:t>
             </a:fld>
             <a:endParaRPr lang="en-US"/>
           </a:p>
@@ -1896,7 +2518,7 @@
           <a:p>
             <a:fld id="{C245FD1E-F56D-0E4D-8B29-731D998991B5}" type="datetimeFigureOut">
               <a:rPr lang="en-US" smtClean="0"/>
-              <a:t>11/2/23</a:t>
+              <a:t>11/16/23</a:t>
             </a:fld>
             <a:endParaRPr lang="en-US"/>
           </a:p>
@@ -2253,7 +2875,7 @@
           <a:p>
             <a:fld id="{C245FD1E-F56D-0E4D-8B29-731D998991B5}" type="datetimeFigureOut">
               <a:rPr lang="en-US" smtClean="0"/>
-              <a:t>11/2/23</a:t>
+              <a:t>11/16/23</a:t>
             </a:fld>
             <a:endParaRPr lang="en-US"/>
           </a:p>
@@ -2610,7 +3232,7 @@
           <a:p>
             <a:fld id="{C245FD1E-F56D-0E4D-8B29-731D998991B5}" type="datetimeFigureOut">
               <a:rPr lang="en-US" smtClean="0"/>
-              <a:t>11/2/23</a:t>
+              <a:t>11/16/23</a:t>
             </a:fld>
             <a:endParaRPr lang="en-US"/>
           </a:p>
@@ -2852,7 +3474,7 @@
           <a:p>
             <a:fld id="{C245FD1E-F56D-0E4D-8B29-731D998991B5}" type="datetimeFigureOut">
               <a:rPr lang="en-US" smtClean="0"/>
-              <a:t>11/2/23</a:t>
+              <a:t>11/16/23</a:t>
             </a:fld>
             <a:endParaRPr lang="en-US"/>
           </a:p>
@@ -3329,7 +3951,7 @@
           <a:p>
             <a:r>
               <a:rPr lang="en-US" dirty="0"/>
-              <a:t>PREDICTING PNEUMONIA IN LUNGS</a:t>
+              <a:t>PREDICTING PNEUMONIA IN LUNGS X-Rays</a:t>
             </a:r>
           </a:p>
         </p:txBody>
@@ -3436,52 +4058,48 @@
             <p:ph idx="1"/>
           </p:nvPr>
         </p:nvSpPr>
-        <p:spPr/>
+        <p:spPr>
+          <a:xfrm>
+            <a:off x="2231136" y="2638044"/>
+            <a:ext cx="7729728" cy="3762756"/>
+          </a:xfrm>
+        </p:spPr>
         <p:txBody>
           <a:bodyPr>
-            <a:normAutofit lnSpcReduction="10000"/>
+            <a:normAutofit/>
           </a:bodyPr>
           <a:lstStyle/>
           <a:p>
             <a:r>
               <a:rPr lang="en-US" dirty="0"/>
-              <a:t>Pneumonia is caused from an infection within the lungs either from bacteria, virus, or other pathogens.</a:t>
-            </a:r>
-          </a:p>
-          <a:p>
-            <a:pPr marL="0" indent="0">
-              <a:buNone/>
-            </a:pPr>
+              <a:t>We have been tasked to improve identification of pneumonia.</a:t>
+            </a:r>
+          </a:p>
+          <a:p>
             <a:endParaRPr lang="en-US" dirty="0"/>
           </a:p>
           <a:p>
             <a:r>
               <a:rPr lang="en-US" dirty="0"/>
-              <a:t>This condition could lead too hospitalizations and potentially death.</a:t>
-            </a:r>
-          </a:p>
-          <a:p>
-            <a:pPr marL="0" indent="0">
-              <a:buNone/>
-            </a:pPr>
+              <a:t>Staffing resources are in a crunch and there aren’t enough radiologists to review all x-rays.</a:t>
+            </a:r>
+          </a:p>
+          <a:p>
             <a:endParaRPr lang="en-US" dirty="0"/>
           </a:p>
           <a:p>
             <a:r>
               <a:rPr lang="en-US" dirty="0"/>
-              <a:t>In the US alone,1 million people are hospitalized and 50,000 die every year.</a:t>
-            </a:r>
-          </a:p>
-          <a:p>
-            <a:pPr marL="0" indent="0">
-              <a:buNone/>
-            </a:pPr>
+              <a:t>We use a machine learning model called a convolutional neural network (CNN) to identify pneumonia in lung x-rays. </a:t>
+            </a:r>
+          </a:p>
+          <a:p>
             <a:endParaRPr lang="en-US" dirty="0"/>
           </a:p>
           <a:p>
             <a:r>
               <a:rPr lang="en-US" dirty="0"/>
-              <a:t>The goal of this project is too create a model that can identify pneumonia lung X-rays.</a:t>
+              <a:t>We believe our findings show promise in using this technique to alleviate hospital staff time.</a:t>
             </a:r>
           </a:p>
         </p:txBody>
@@ -3595,7 +4213,7 @@
           <a:p>
             <a:r>
               <a:rPr lang="en-US" dirty="0"/>
-              <a:t>The records in each set were re-combined before they were split into training/validation set for modeling.</a:t>
+              <a:t>The data only contained chest x-rays of patients that are less than 5 years old.</a:t>
             </a:r>
           </a:p>
         </p:txBody>
@@ -3665,7 +4283,7 @@
           <p:cNvPr id="2" name="Title 1">
             <a:extLst>
               <a:ext uri="{FF2B5EF4-FFF2-40B4-BE49-F238E27FC236}">
-                <a16:creationId xmlns:a16="http://schemas.microsoft.com/office/drawing/2014/main" id="{8ED2E1A2-FDDB-D893-A480-46AE4E4FD86E}"/>
+                <a16:creationId xmlns:a16="http://schemas.microsoft.com/office/drawing/2014/main" id="{05B27B10-6647-CC83-4C82-C8038D98CC26}"/>
               </a:ext>
             </a:extLst>
           </p:cNvPr>
@@ -3676,128 +4294,22 @@
             <p:ph type="title"/>
           </p:nvPr>
         </p:nvSpPr>
-        <p:spPr>
-          <a:xfrm>
-            <a:off x="2310504" y="335582"/>
-            <a:ext cx="7729728" cy="1188720"/>
-          </a:xfrm>
-        </p:spPr>
+        <p:spPr/>
         <p:txBody>
           <a:bodyPr/>
           <a:lstStyle/>
           <a:p>
             <a:r>
               <a:rPr lang="en-US" dirty="0"/>
-              <a:t>Model Results</a:t>
-            </a:r>
-          </a:p>
-        </p:txBody>
-      </p:sp>
-      <p:sp>
-        <p:nvSpPr>
-          <p:cNvPr id="3" name="Content Placeholder 2">
-            <a:extLst>
-              <a:ext uri="{FF2B5EF4-FFF2-40B4-BE49-F238E27FC236}">
-                <a16:creationId xmlns:a16="http://schemas.microsoft.com/office/drawing/2014/main" id="{5A6FC140-D78F-F615-1845-B3DA8A9E1E7D}"/>
-              </a:ext>
-            </a:extLst>
-          </p:cNvPr>
-          <p:cNvSpPr>
-            <a:spLocks noGrp="1"/>
-          </p:cNvSpPr>
-          <p:nvPr>
-            <p:ph idx="1"/>
-          </p:nvPr>
-        </p:nvSpPr>
-        <p:spPr>
-          <a:xfrm>
-            <a:off x="537084" y="1939532"/>
-            <a:ext cx="5086476" cy="4503914"/>
-          </a:xfrm>
-        </p:spPr>
-        <p:txBody>
-          <a:bodyPr/>
-          <a:lstStyle/>
-          <a:p>
-            <a:r>
-              <a:rPr lang="en-US" dirty="0"/>
-              <a:t>The final model was selected on the following:</a:t>
-            </a:r>
-          </a:p>
-          <a:p>
-            <a:pPr lvl="1"/>
-            <a:r>
-              <a:rPr lang="en-US" dirty="0"/>
-              <a:t> How accurate it’s predictions were</a:t>
-            </a:r>
-          </a:p>
-          <a:p>
-            <a:pPr lvl="1"/>
-            <a:r>
-              <a:rPr lang="en-US" dirty="0"/>
-              <a:t>How well it identified lungs that have pneumonia. </a:t>
-            </a:r>
-          </a:p>
-          <a:p>
-            <a:pPr marL="228600" lvl="1" indent="0">
-              <a:buNone/>
-            </a:pPr>
-            <a:endParaRPr lang="en-US" dirty="0"/>
-          </a:p>
-          <a:p>
-            <a:r>
-              <a:rPr lang="en-US" dirty="0"/>
-              <a:t>The final model, while lower in accuracy identified the most number of lungs with pneumonia.</a:t>
-            </a:r>
-          </a:p>
-          <a:p>
-            <a:pPr marL="0" indent="0">
-              <a:buNone/>
-            </a:pPr>
-            <a:endParaRPr lang="en-US" dirty="0"/>
-          </a:p>
-          <a:p>
-            <a:r>
-              <a:rPr lang="en-US" dirty="0"/>
-              <a:t>This model would have saved the most amount off lives.</a:t>
-            </a:r>
-          </a:p>
-        </p:txBody>
-      </p:sp>
-      <p:pic>
-        <p:nvPicPr>
-          <p:cNvPr id="5" name="Picture 4">
-            <a:extLst>
-              <a:ext uri="{FF2B5EF4-FFF2-40B4-BE49-F238E27FC236}">
-                <a16:creationId xmlns:a16="http://schemas.microsoft.com/office/drawing/2014/main" id="{56163C3D-A8BD-7F02-FC80-87A357CC1E95}"/>
-              </a:ext>
-            </a:extLst>
-          </p:cNvPr>
-          <p:cNvPicPr>
-            <a:picLocks noChangeAspect="1"/>
-          </p:cNvPicPr>
-          <p:nvPr/>
-        </p:nvPicPr>
-        <p:blipFill>
-          <a:blip r:embed="rId2"/>
-          <a:stretch>
-            <a:fillRect/>
-          </a:stretch>
-        </p:blipFill>
-        <p:spPr>
-          <a:xfrm>
-            <a:off x="5996211" y="1841130"/>
-            <a:ext cx="5895922" cy="4332094"/>
-          </a:xfrm>
-          <a:prstGeom prst="rect">
-            <a:avLst/>
-          </a:prstGeom>
-        </p:spPr>
-      </p:pic>
+              <a:t>Data Continued</a:t>
+            </a:r>
+          </a:p>
+        </p:txBody>
+      </p:sp>
     </p:spTree>
     <p:extLst>
       <p:ext uri="{BB962C8B-B14F-4D97-AF65-F5344CB8AC3E}">
-        <p14:creationId xmlns:p14="http://schemas.microsoft.com/office/powerpoint/2010/main" val="1699116216"/>
+        <p14:creationId xmlns:p14="http://schemas.microsoft.com/office/powerpoint/2010/main" val="2782979152"/>
       </p:ext>
     </p:extLst>
   </p:cSld>
@@ -3829,7 +4341,7 @@
           <p:cNvPr id="2" name="Title 1">
             <a:extLst>
               <a:ext uri="{FF2B5EF4-FFF2-40B4-BE49-F238E27FC236}">
-                <a16:creationId xmlns:a16="http://schemas.microsoft.com/office/drawing/2014/main" id="{8ED2E1A2-FDDB-D893-A480-46AE4E4FD86E}"/>
+                <a16:creationId xmlns:a16="http://schemas.microsoft.com/office/drawing/2014/main" id="{D83DD1FE-96C7-B60C-B335-151407F2422B}"/>
               </a:ext>
             </a:extLst>
           </p:cNvPr>
@@ -3847,7 +4359,7 @@
           <a:p>
             <a:r>
               <a:rPr lang="en-US" dirty="0"/>
-              <a:t>Recommendations</a:t>
+              <a:t>Models and Evaluation criteria</a:t>
             </a:r>
           </a:p>
         </p:txBody>
@@ -3857,7 +4369,7 @@
           <p:cNvPr id="3" name="Content Placeholder 2">
             <a:extLst>
               <a:ext uri="{FF2B5EF4-FFF2-40B4-BE49-F238E27FC236}">
-                <a16:creationId xmlns:a16="http://schemas.microsoft.com/office/drawing/2014/main" id="{5A6FC140-D78F-F615-1845-B3DA8A9E1E7D}"/>
+                <a16:creationId xmlns:a16="http://schemas.microsoft.com/office/drawing/2014/main" id="{FD13DB36-5520-537D-F547-FCD10185E936}"/>
               </a:ext>
             </a:extLst>
           </p:cNvPr>
@@ -3868,32 +4380,53 @@
             <p:ph idx="1"/>
           </p:nvPr>
         </p:nvSpPr>
-        <p:spPr/>
-        <p:txBody>
-          <a:bodyPr/>
+        <p:spPr>
+          <a:xfrm>
+            <a:off x="2231136" y="2638044"/>
+            <a:ext cx="7729728" cy="3762756"/>
+          </a:xfrm>
+        </p:spPr>
+        <p:txBody>
+          <a:bodyPr>
+            <a:normAutofit/>
+          </a:bodyPr>
           <a:lstStyle/>
           <a:p>
             <a:r>
               <a:rPr lang="en-US" dirty="0"/>
-              <a:t>These results on the small subset off data are promising since a validation accuracy off 94% was achieved.</a:t>
-            </a:r>
-          </a:p>
-          <a:p>
-            <a:endParaRPr lang="en-US" dirty="0"/>
+              <a:t>Due to resource and the limits off the machines, only 2500 off the 5800 X-rays could be used in training the model. </a:t>
+            </a:r>
           </a:p>
           <a:p>
             <a:r>
               <a:rPr lang="en-US" dirty="0"/>
-              <a:t>Further research is needed before this model is implemented in hospitals.</a:t>
-            </a:r>
-          </a:p>
-          <a:p>
-            <a:endParaRPr lang="en-US" dirty="0"/>
+              <a:t>Four CNN models were created as part off this project.</a:t>
+            </a:r>
           </a:p>
           <a:p>
             <a:r>
               <a:rPr lang="en-US" dirty="0"/>
-              <a:t>Training on larger and more diverse data sets are needed. This dataset only contained lung x-rays off children under 5.</a:t>
+              <a:t>The evaluation criteria were accuracy and recall.</a:t>
+            </a:r>
+          </a:p>
+          <a:p>
+            <a:pPr lvl="1"/>
+            <a:r>
+              <a:rPr lang="en-US" dirty="0"/>
+              <a:t>Accuracy: Higher accuracy means more model predictions were correct (lower false positive)</a:t>
+            </a:r>
+          </a:p>
+          <a:p>
+            <a:pPr lvl="1"/>
+            <a:r>
+              <a:rPr lang="en-US" dirty="0"/>
+              <a:t>Recall: Higher recall means more pneumonia x-rays were identified (lower false negatives)</a:t>
+            </a:r>
+          </a:p>
+          <a:p>
+            <a:r>
+              <a:rPr lang="en-US" dirty="0"/>
+              <a:t>Recall was prioritized over accuracy because a higher recall implies that more lives were saved.</a:t>
             </a:r>
           </a:p>
         </p:txBody>
@@ -3901,7 +4434,7 @@
     </p:spTree>
     <p:extLst>
       <p:ext uri="{BB962C8B-B14F-4D97-AF65-F5344CB8AC3E}">
-        <p14:creationId xmlns:p14="http://schemas.microsoft.com/office/powerpoint/2010/main" val="809386630"/>
+        <p14:creationId xmlns:p14="http://schemas.microsoft.com/office/powerpoint/2010/main" val="3689225871"/>
       </p:ext>
     </p:extLst>
   </p:cSld>
@@ -3944,14 +4477,19 @@
             <p:ph type="title"/>
           </p:nvPr>
         </p:nvSpPr>
-        <p:spPr/>
+        <p:spPr>
+          <a:xfrm>
+            <a:off x="2310504" y="335582"/>
+            <a:ext cx="7729728" cy="1188720"/>
+          </a:xfrm>
+        </p:spPr>
         <p:txBody>
           <a:bodyPr/>
           <a:lstStyle/>
           <a:p>
             <a:r>
               <a:rPr lang="en-US" dirty="0"/>
-              <a:t>Future Projects</a:t>
+              <a:t>Model Results</a:t>
             </a:r>
           </a:p>
         </p:txBody>
@@ -3972,6 +4510,296 @@
             <p:ph idx="1"/>
           </p:nvPr>
         </p:nvSpPr>
+        <p:spPr>
+          <a:xfrm>
+            <a:off x="537084" y="1640000"/>
+            <a:ext cx="11654916" cy="1489468"/>
+          </a:xfrm>
+        </p:spPr>
+        <p:txBody>
+          <a:bodyPr>
+            <a:normAutofit/>
+          </a:bodyPr>
+          <a:lstStyle/>
+          <a:p>
+            <a:r>
+              <a:rPr lang="en-US" dirty="0"/>
+              <a:t>The model’s accuracies ranged from 94.5% to 95.5%. They were only off by 1%.</a:t>
+            </a:r>
+          </a:p>
+          <a:p>
+            <a:r>
+              <a:rPr lang="en-US" dirty="0"/>
+              <a:t>The model’s recall ranged from 86 to 92%.</a:t>
+            </a:r>
+          </a:p>
+          <a:p>
+            <a:r>
+              <a:rPr lang="en-US" dirty="0"/>
+              <a:t>Since recall is more important than accuracy, we are </a:t>
+            </a:r>
+            <a:r>
+              <a:rPr lang="en-US"/>
+              <a:t>selecting model 4.</a:t>
+            </a:r>
+            <a:endParaRPr lang="en-US" dirty="0"/>
+          </a:p>
+          <a:p>
+            <a:pPr marL="0" indent="0">
+              <a:buNone/>
+            </a:pPr>
+            <a:endParaRPr lang="en-US" dirty="0"/>
+          </a:p>
+        </p:txBody>
+      </p:sp>
+      <p:pic>
+        <p:nvPicPr>
+          <p:cNvPr id="5" name="Picture 4">
+            <a:extLst>
+              <a:ext uri="{FF2B5EF4-FFF2-40B4-BE49-F238E27FC236}">
+                <a16:creationId xmlns:a16="http://schemas.microsoft.com/office/drawing/2014/main" id="{56163C3D-A8BD-7F02-FC80-87A357CC1E95}"/>
+              </a:ext>
+            </a:extLst>
+          </p:cNvPr>
+          <p:cNvPicPr>
+            <a:picLocks noChangeAspect="1"/>
+          </p:cNvPicPr>
+          <p:nvPr/>
+        </p:nvPicPr>
+        <p:blipFill>
+          <a:blip r:embed="rId2"/>
+          <a:stretch>
+            <a:fillRect/>
+          </a:stretch>
+        </p:blipFill>
+        <p:spPr>
+          <a:xfrm>
+            <a:off x="6175368" y="3129468"/>
+            <a:ext cx="4689369" cy="3445566"/>
+          </a:xfrm>
+          <a:prstGeom prst="rect">
+            <a:avLst/>
+          </a:prstGeom>
+        </p:spPr>
+      </p:pic>
+      <p:pic>
+        <p:nvPicPr>
+          <p:cNvPr id="4" name="Picture 3">
+            <a:extLst>
+              <a:ext uri="{FF2B5EF4-FFF2-40B4-BE49-F238E27FC236}">
+                <a16:creationId xmlns:a16="http://schemas.microsoft.com/office/drawing/2014/main" id="{5A176027-2AAE-51CD-D50F-5A45357ADD43}"/>
+              </a:ext>
+            </a:extLst>
+          </p:cNvPr>
+          <p:cNvPicPr>
+            <a:picLocks noChangeAspect="1"/>
+          </p:cNvPicPr>
+          <p:nvPr/>
+        </p:nvPicPr>
+        <p:blipFill>
+          <a:blip r:embed="rId3"/>
+          <a:stretch>
+            <a:fillRect/>
+          </a:stretch>
+        </p:blipFill>
+        <p:spPr>
+          <a:xfrm>
+            <a:off x="1036320" y="3191000"/>
+            <a:ext cx="4339590" cy="3294453"/>
+          </a:xfrm>
+          <a:prstGeom prst="rect">
+            <a:avLst/>
+          </a:prstGeom>
+        </p:spPr>
+      </p:pic>
+    </p:spTree>
+    <p:extLst>
+      <p:ext uri="{BB962C8B-B14F-4D97-AF65-F5344CB8AC3E}">
+        <p14:creationId xmlns:p14="http://schemas.microsoft.com/office/powerpoint/2010/main" val="1699116216"/>
+      </p:ext>
+    </p:extLst>
+  </p:cSld>
+  <p:clrMapOvr>
+    <a:masterClrMapping/>
+  </p:clrMapOvr>
+</p:sld>
+</file>
+
+<file path=ppt/slides/slide7.xml><?xml version="1.0" encoding="utf-8"?>
+<p:sld xmlns:a="http://schemas.openxmlformats.org/drawingml/2006/main" xmlns:r="http://schemas.openxmlformats.org/officeDocument/2006/relationships" xmlns:p="http://schemas.openxmlformats.org/presentationml/2006/main">
+  <p:cSld>
+    <p:spTree>
+      <p:nvGrpSpPr>
+        <p:cNvPr id="1" name=""/>
+        <p:cNvGrpSpPr/>
+        <p:nvPr/>
+      </p:nvGrpSpPr>
+      <p:grpSpPr>
+        <a:xfrm>
+          <a:off x="0" y="0"/>
+          <a:ext cx="0" cy="0"/>
+          <a:chOff x="0" y="0"/>
+          <a:chExt cx="0" cy="0"/>
+        </a:xfrm>
+      </p:grpSpPr>
+      <p:sp>
+        <p:nvSpPr>
+          <p:cNvPr id="2" name="Title 1">
+            <a:extLst>
+              <a:ext uri="{FF2B5EF4-FFF2-40B4-BE49-F238E27FC236}">
+                <a16:creationId xmlns:a16="http://schemas.microsoft.com/office/drawing/2014/main" id="{8ED2E1A2-FDDB-D893-A480-46AE4E4FD86E}"/>
+              </a:ext>
+            </a:extLst>
+          </p:cNvPr>
+          <p:cNvSpPr>
+            <a:spLocks noGrp="1"/>
+          </p:cNvSpPr>
+          <p:nvPr>
+            <p:ph type="title"/>
+          </p:nvPr>
+        </p:nvSpPr>
+        <p:spPr/>
+        <p:txBody>
+          <a:bodyPr/>
+          <a:lstStyle/>
+          <a:p>
+            <a:r>
+              <a:rPr lang="en-US" dirty="0"/>
+              <a:t>Recommendations</a:t>
+            </a:r>
+          </a:p>
+        </p:txBody>
+      </p:sp>
+      <p:sp>
+        <p:nvSpPr>
+          <p:cNvPr id="3" name="Content Placeholder 2">
+            <a:extLst>
+              <a:ext uri="{FF2B5EF4-FFF2-40B4-BE49-F238E27FC236}">
+                <a16:creationId xmlns:a16="http://schemas.microsoft.com/office/drawing/2014/main" id="{5A6FC140-D78F-F615-1845-B3DA8A9E1E7D}"/>
+              </a:ext>
+            </a:extLst>
+          </p:cNvPr>
+          <p:cNvSpPr>
+            <a:spLocks noGrp="1"/>
+          </p:cNvSpPr>
+          <p:nvPr>
+            <p:ph idx="1"/>
+          </p:nvPr>
+        </p:nvSpPr>
+        <p:spPr/>
+        <p:txBody>
+          <a:bodyPr>
+            <a:normAutofit/>
+          </a:bodyPr>
+          <a:lstStyle/>
+          <a:p>
+            <a:r>
+              <a:rPr lang="en-US" dirty="0"/>
+              <a:t>Recommend that you move forward with using the final model since it had the highest recall by 3% and only was 1% less accurate than the other models. </a:t>
+            </a:r>
+          </a:p>
+          <a:p>
+            <a:r>
+              <a:rPr lang="en-US" dirty="0"/>
+              <a:t>Further research on how to operationalize this model in hospital workflows. Examples:</a:t>
+            </a:r>
+          </a:p>
+          <a:p>
+            <a:pPr lvl="1"/>
+            <a:r>
+              <a:rPr lang="en-US" dirty="0"/>
+              <a:t>How are false positives and negatives handled in a hospital? </a:t>
+            </a:r>
+          </a:p>
+          <a:p>
+            <a:pPr lvl="1"/>
+            <a:r>
+              <a:rPr lang="en-US" dirty="0"/>
+              <a:t>Is there a method for clinicians to quickly determine that the patient does not have pneumonia?</a:t>
+            </a:r>
+          </a:p>
+          <a:p>
+            <a:r>
+              <a:rPr lang="en-US" dirty="0"/>
+              <a:t>Training on larger and more diverse data sets is necessary before it’s deployed. </a:t>
+            </a:r>
+          </a:p>
+        </p:txBody>
+      </p:sp>
+    </p:spTree>
+    <p:extLst>
+      <p:ext uri="{BB962C8B-B14F-4D97-AF65-F5344CB8AC3E}">
+        <p14:creationId xmlns:p14="http://schemas.microsoft.com/office/powerpoint/2010/main" val="809386630"/>
+      </p:ext>
+    </p:extLst>
+  </p:cSld>
+  <p:clrMapOvr>
+    <a:masterClrMapping/>
+  </p:clrMapOvr>
+</p:sld>
+</file>
+
+<file path=ppt/slides/slide8.xml><?xml version="1.0" encoding="utf-8"?>
+<p:sld xmlns:a="http://schemas.openxmlformats.org/drawingml/2006/main" xmlns:r="http://schemas.openxmlformats.org/officeDocument/2006/relationships" xmlns:p="http://schemas.openxmlformats.org/presentationml/2006/main">
+  <p:cSld>
+    <p:spTree>
+      <p:nvGrpSpPr>
+        <p:cNvPr id="1" name=""/>
+        <p:cNvGrpSpPr/>
+        <p:nvPr/>
+      </p:nvGrpSpPr>
+      <p:grpSpPr>
+        <a:xfrm>
+          <a:off x="0" y="0"/>
+          <a:ext cx="0" cy="0"/>
+          <a:chOff x="0" y="0"/>
+          <a:chExt cx="0" cy="0"/>
+        </a:xfrm>
+      </p:grpSpPr>
+      <p:sp>
+        <p:nvSpPr>
+          <p:cNvPr id="2" name="Title 1">
+            <a:extLst>
+              <a:ext uri="{FF2B5EF4-FFF2-40B4-BE49-F238E27FC236}">
+                <a16:creationId xmlns:a16="http://schemas.microsoft.com/office/drawing/2014/main" id="{8ED2E1A2-FDDB-D893-A480-46AE4E4FD86E}"/>
+              </a:ext>
+            </a:extLst>
+          </p:cNvPr>
+          <p:cNvSpPr>
+            <a:spLocks noGrp="1"/>
+          </p:cNvSpPr>
+          <p:nvPr>
+            <p:ph type="title"/>
+          </p:nvPr>
+        </p:nvSpPr>
+        <p:spPr/>
+        <p:txBody>
+          <a:bodyPr/>
+          <a:lstStyle/>
+          <a:p>
+            <a:r>
+              <a:rPr lang="en-US" dirty="0"/>
+              <a:t>Future Projects</a:t>
+            </a:r>
+          </a:p>
+        </p:txBody>
+      </p:sp>
+      <p:sp>
+        <p:nvSpPr>
+          <p:cNvPr id="3" name="Content Placeholder 2">
+            <a:extLst>
+              <a:ext uri="{FF2B5EF4-FFF2-40B4-BE49-F238E27FC236}">
+                <a16:creationId xmlns:a16="http://schemas.microsoft.com/office/drawing/2014/main" id="{5A6FC140-D78F-F615-1845-B3DA8A9E1E7D}"/>
+              </a:ext>
+            </a:extLst>
+          </p:cNvPr>
+          <p:cNvSpPr>
+            <a:spLocks noGrp="1"/>
+          </p:cNvSpPr>
+          <p:nvPr>
+            <p:ph idx="1"/>
+          </p:nvPr>
+        </p:nvSpPr>
         <p:spPr/>
         <p:txBody>
           <a:bodyPr/>
@@ -4003,7 +4831,21 @@
           <a:p>
             <a:r>
               <a:rPr lang="en-US" dirty="0"/>
-              <a:t>Implement model in a small hospital then scale it up.</a:t>
+              <a:t>Deploy the model in a small hospital. Observe the following:</a:t>
+            </a:r>
+          </a:p>
+          <a:p>
+            <a:pPr lvl="1"/>
+            <a:r>
+              <a:rPr lang="en-US" dirty="0"/>
+              <a:t>Record time saved by radiologists</a:t>
+            </a:r>
+          </a:p>
+          <a:p>
+            <a:pPr lvl="1"/>
+            <a:r>
+              <a:rPr lang="en-US" dirty="0"/>
+              <a:t>impact of false positives on clinician workflows.</a:t>
             </a:r>
           </a:p>
           <a:p>
@@ -4024,7 +4866,7 @@
 </p:sld>
 </file>
 
-<file path=ppt/slides/slide7.xml><?xml version="1.0" encoding="utf-8"?>
+<file path=ppt/slides/slide9.xml><?xml version="1.0" encoding="utf-8"?>
 <p:sld xmlns:a="http://schemas.openxmlformats.org/drawingml/2006/main" xmlns:r="http://schemas.openxmlformats.org/officeDocument/2006/relationships" xmlns:p="http://schemas.openxmlformats.org/presentationml/2006/main">
   <p:cSld>
     <p:spTree>
@@ -4414,4 +5256,299 @@
     </a:ext>
   </a:extLst>
 </a:theme>
+</file>
+
+<file path=ppt/theme/theme2.xml><?xml version="1.0" encoding="utf-8"?>
+<a:theme xmlns:a="http://schemas.openxmlformats.org/drawingml/2006/main" name="Office Theme">
+  <a:themeElements>
+    <a:clrScheme name="Office">
+      <a:dk1>
+        <a:sysClr val="windowText" lastClr="000000"/>
+      </a:dk1>
+      <a:lt1>
+        <a:sysClr val="window" lastClr="FFFFFF"/>
+      </a:lt1>
+      <a:dk2>
+        <a:srgbClr val="44546A"/>
+      </a:dk2>
+      <a:lt2>
+        <a:srgbClr val="E7E6E6"/>
+      </a:lt2>
+      <a:accent1>
+        <a:srgbClr val="4472C4"/>
+      </a:accent1>
+      <a:accent2>
+        <a:srgbClr val="ED7D31"/>
+      </a:accent2>
+      <a:accent3>
+        <a:srgbClr val="A5A5A5"/>
+      </a:accent3>
+      <a:accent4>
+        <a:srgbClr val="FFC000"/>
+      </a:accent4>
+      <a:accent5>
+        <a:srgbClr val="5B9BD5"/>
+      </a:accent5>
+      <a:accent6>
+        <a:srgbClr val="70AD47"/>
+      </a:accent6>
+      <a:hlink>
+        <a:srgbClr val="0563C1"/>
+      </a:hlink>
+      <a:folHlink>
+        <a:srgbClr val="954F72"/>
+      </a:folHlink>
+    </a:clrScheme>
+    <a:fontScheme name="Office">
+      <a:majorFont>
+        <a:latin typeface="Calibri Light" panose="020F0302020204030204"/>
+        <a:ea typeface=""/>
+        <a:cs typeface=""/>
+        <a:font script="Jpan" typeface="游ゴシック Light"/>
+        <a:font script="Hang" typeface="맑은 고딕"/>
+        <a:font script="Hans" typeface="等线 Light"/>
+        <a:font script="Hant" typeface="新細明體"/>
+        <a:font script="Arab" typeface="Times New Roman"/>
+        <a:font script="Hebr" typeface="Times New Roman"/>
+        <a:font script="Thai" typeface="Angsana New"/>
+        <a:font script="Ethi" typeface="Nyala"/>
+        <a:font script="Beng" typeface="Vrinda"/>
+        <a:font script="Gujr" typeface="Shruti"/>
+        <a:font script="Khmr" typeface="MoolBoran"/>
+        <a:font script="Knda" typeface="Tunga"/>
+        <a:font script="Guru" typeface="Raavi"/>
+        <a:font script="Cans" typeface="Euphemia"/>
+        <a:font script="Cher" typeface="Plantagenet Cherokee"/>
+        <a:font script="Yiii" typeface="Microsoft Yi Baiti"/>
+        <a:font script="Tibt" typeface="Microsoft Himalaya"/>
+        <a:font script="Thaa" typeface="MV Boli"/>
+        <a:font script="Deva" typeface="Mangal"/>
+        <a:font script="Telu" typeface="Gautami"/>
+        <a:font script="Taml" typeface="Latha"/>
+        <a:font script="Syrc" typeface="Estrangelo Edessa"/>
+        <a:font script="Orya" typeface="Kalinga"/>
+        <a:font script="Mlym" typeface="Kartika"/>
+        <a:font script="Laoo" typeface="DokChampa"/>
+        <a:font script="Sinh" typeface="Iskoola Pota"/>
+        <a:font script="Mong" typeface="Mongolian Baiti"/>
+        <a:font script="Viet" typeface="Times New Roman"/>
+        <a:font script="Uigh" typeface="Microsoft Uighur"/>
+        <a:font script="Geor" typeface="Sylfaen"/>
+        <a:font script="Armn" typeface="Arial"/>
+        <a:font script="Bugi" typeface="Leelawadee UI"/>
+        <a:font script="Bopo" typeface="Microsoft JhengHei"/>
+        <a:font script="Java" typeface="Javanese Text"/>
+        <a:font script="Lisu" typeface="Segoe UI"/>
+        <a:font script="Mymr" typeface="Myanmar Text"/>
+        <a:font script="Nkoo" typeface="Ebrima"/>
+        <a:font script="Olck" typeface="Nirmala UI"/>
+        <a:font script="Osma" typeface="Ebrima"/>
+        <a:font script="Phag" typeface="Phagspa"/>
+        <a:font script="Syrn" typeface="Estrangelo Edessa"/>
+        <a:font script="Syrj" typeface="Estrangelo Edessa"/>
+        <a:font script="Syre" typeface="Estrangelo Edessa"/>
+        <a:font script="Sora" typeface="Nirmala UI"/>
+        <a:font script="Tale" typeface="Microsoft Tai Le"/>
+        <a:font script="Talu" typeface="Microsoft New Tai Lue"/>
+        <a:font script="Tfng" typeface="Ebrima"/>
+      </a:majorFont>
+      <a:minorFont>
+        <a:latin typeface="Calibri" panose="020F0502020204030204"/>
+        <a:ea typeface=""/>
+        <a:cs typeface=""/>
+        <a:font script="Jpan" typeface="游ゴシック"/>
+        <a:font script="Hang" typeface="맑은 고딕"/>
+        <a:font script="Hans" typeface="等线"/>
+        <a:font script="Hant" typeface="新細明體"/>
+        <a:font script="Arab" typeface="Arial"/>
+        <a:font script="Hebr" typeface="Arial"/>
+        <a:font script="Thai" typeface="Cordia New"/>
+        <a:font script="Ethi" typeface="Nyala"/>
+        <a:font script="Beng" typeface="Vrinda"/>
+        <a:font script="Gujr" typeface="Shruti"/>
+        <a:font script="Khmr" typeface="DaunPenh"/>
+        <a:font script="Knda" typeface="Tunga"/>
+        <a:font script="Guru" typeface="Raavi"/>
+        <a:font script="Cans" typeface="Euphemia"/>
+        <a:font script="Cher" typeface="Plantagenet Cherokee"/>
+        <a:font script="Yiii" typeface="Microsoft Yi Baiti"/>
+        <a:font script="Tibt" typeface="Microsoft Himalaya"/>
+        <a:font script="Thaa" typeface="MV Boli"/>
+        <a:font script="Deva" typeface="Mangal"/>
+        <a:font script="Telu" typeface="Gautami"/>
+        <a:font script="Taml" typeface="Latha"/>
+        <a:font script="Syrc" typeface="Estrangelo Edessa"/>
+        <a:font script="Orya" typeface="Kalinga"/>
+        <a:font script="Mlym" typeface="Kartika"/>
+        <a:font script="Laoo" typeface="DokChampa"/>
+        <a:font script="Sinh" typeface="Iskoola Pota"/>
+        <a:font script="Mong" typeface="Mongolian Baiti"/>
+        <a:font script="Viet" typeface="Arial"/>
+        <a:font script="Uigh" typeface="Microsoft Uighur"/>
+        <a:font script="Geor" typeface="Sylfaen"/>
+        <a:font script="Armn" typeface="Arial"/>
+        <a:font script="Bugi" typeface="Leelawadee UI"/>
+        <a:font script="Bopo" typeface="Microsoft JhengHei"/>
+        <a:font script="Java" typeface="Javanese Text"/>
+        <a:font script="Lisu" typeface="Segoe UI"/>
+        <a:font script="Mymr" typeface="Myanmar Text"/>
+        <a:font script="Nkoo" typeface="Ebrima"/>
+        <a:font script="Olck" typeface="Nirmala UI"/>
+        <a:font script="Osma" typeface="Ebrima"/>
+        <a:font script="Phag" typeface="Phagspa"/>
+        <a:font script="Syrn" typeface="Estrangelo Edessa"/>
+        <a:font script="Syrj" typeface="Estrangelo Edessa"/>
+        <a:font script="Syre" typeface="Estrangelo Edessa"/>
+        <a:font script="Sora" typeface="Nirmala UI"/>
+        <a:font script="Tale" typeface="Microsoft Tai Le"/>
+        <a:font script="Talu" typeface="Microsoft New Tai Lue"/>
+        <a:font script="Tfng" typeface="Ebrima"/>
+      </a:minorFont>
+    </a:fontScheme>
+    <a:fmtScheme name="Office">
+      <a:fillStyleLst>
+        <a:solidFill>
+          <a:schemeClr val="phClr"/>
+        </a:solidFill>
+        <a:gradFill rotWithShape="1">
+          <a:gsLst>
+            <a:gs pos="0">
+              <a:schemeClr val="phClr">
+                <a:lumMod val="110000"/>
+                <a:satMod val="105000"/>
+                <a:tint val="67000"/>
+              </a:schemeClr>
+            </a:gs>
+            <a:gs pos="50000">
+              <a:schemeClr val="phClr">
+                <a:lumMod val="105000"/>
+                <a:satMod val="103000"/>
+                <a:tint val="73000"/>
+              </a:schemeClr>
+            </a:gs>
+            <a:gs pos="100000">
+              <a:schemeClr val="phClr">
+                <a:lumMod val="105000"/>
+                <a:satMod val="109000"/>
+                <a:tint val="81000"/>
+              </a:schemeClr>
+            </a:gs>
+          </a:gsLst>
+          <a:lin ang="5400000" scaled="0"/>
+        </a:gradFill>
+        <a:gradFill rotWithShape="1">
+          <a:gsLst>
+            <a:gs pos="0">
+              <a:schemeClr val="phClr">
+                <a:satMod val="103000"/>
+                <a:lumMod val="102000"/>
+                <a:tint val="94000"/>
+              </a:schemeClr>
+            </a:gs>
+            <a:gs pos="50000">
+              <a:schemeClr val="phClr">
+                <a:satMod val="110000"/>
+                <a:lumMod val="100000"/>
+                <a:shade val="100000"/>
+              </a:schemeClr>
+            </a:gs>
+            <a:gs pos="100000">
+              <a:schemeClr val="phClr">
+                <a:lumMod val="99000"/>
+                <a:satMod val="120000"/>
+                <a:shade val="78000"/>
+              </a:schemeClr>
+            </a:gs>
+          </a:gsLst>
+          <a:lin ang="5400000" scaled="0"/>
+        </a:gradFill>
+      </a:fillStyleLst>
+      <a:lnStyleLst>
+        <a:ln w="6350" cap="flat" cmpd="sng" algn="ctr">
+          <a:solidFill>
+            <a:schemeClr val="phClr"/>
+          </a:solidFill>
+          <a:prstDash val="solid"/>
+          <a:miter lim="800000"/>
+        </a:ln>
+        <a:ln w="12700" cap="flat" cmpd="sng" algn="ctr">
+          <a:solidFill>
+            <a:schemeClr val="phClr"/>
+          </a:solidFill>
+          <a:prstDash val="solid"/>
+          <a:miter lim="800000"/>
+        </a:ln>
+        <a:ln w="19050" cap="flat" cmpd="sng" algn="ctr">
+          <a:solidFill>
+            <a:schemeClr val="phClr"/>
+          </a:solidFill>
+          <a:prstDash val="solid"/>
+          <a:miter lim="800000"/>
+        </a:ln>
+      </a:lnStyleLst>
+      <a:effectStyleLst>
+        <a:effectStyle>
+          <a:effectLst/>
+        </a:effectStyle>
+        <a:effectStyle>
+          <a:effectLst/>
+        </a:effectStyle>
+        <a:effectStyle>
+          <a:effectLst>
+            <a:outerShdw blurRad="57150" dist="19050" dir="5400000" algn="ctr" rotWithShape="0">
+              <a:srgbClr val="000000">
+                <a:alpha val="63000"/>
+              </a:srgbClr>
+            </a:outerShdw>
+          </a:effectLst>
+        </a:effectStyle>
+      </a:effectStyleLst>
+      <a:bgFillStyleLst>
+        <a:solidFill>
+          <a:schemeClr val="phClr"/>
+        </a:solidFill>
+        <a:solidFill>
+          <a:schemeClr val="phClr">
+            <a:tint val="95000"/>
+            <a:satMod val="170000"/>
+          </a:schemeClr>
+        </a:solidFill>
+        <a:gradFill rotWithShape="1">
+          <a:gsLst>
+            <a:gs pos="0">
+              <a:schemeClr val="phClr">
+                <a:tint val="93000"/>
+                <a:satMod val="150000"/>
+                <a:shade val="98000"/>
+                <a:lumMod val="102000"/>
+              </a:schemeClr>
+            </a:gs>
+            <a:gs pos="50000">
+              <a:schemeClr val="phClr">
+                <a:tint val="98000"/>
+                <a:satMod val="130000"/>
+                <a:shade val="90000"/>
+                <a:lumMod val="103000"/>
+              </a:schemeClr>
+            </a:gs>
+            <a:gs pos="100000">
+              <a:schemeClr val="phClr">
+                <a:shade val="63000"/>
+                <a:satMod val="120000"/>
+              </a:schemeClr>
+            </a:gs>
+          </a:gsLst>
+          <a:lin ang="5400000" scaled="0"/>
+        </a:gradFill>
+      </a:bgFillStyleLst>
+    </a:fmtScheme>
+  </a:themeElements>
+  <a:objectDefaults/>
+  <a:extraClrSchemeLst/>
+  <a:extLst>
+    <a:ext uri="{05A4C25C-085E-4340-85A3-A5531E510DB2}">
+      <thm15:themeFamily xmlns:thm15="http://schemas.microsoft.com/office/thememl/2012/main" name="Office Theme" id="{62F939B6-93AF-4DB8-9C6B-D6C7DFDC589F}" vid="{4A3C46E8-61CC-4603-A589-7422A47A8E4A}"/>
+    </a:ext>
+  </a:extLst>
+</a:theme>
 </file>
</xml_diff>

<commit_message>
Added confusion matrices and updated presentation
</commit_message>
<xml_diff>
--- a/Presentation/Presentation.pptx
+++ b/Presentation/Presentation.pptx
@@ -5,7 +5,7 @@
     <p:sldMasterId id="2147483732" r:id="rId1"/>
   </p:sldMasterIdLst>
   <p:notesMasterIdLst>
-    <p:notesMasterId r:id="rId11"/>
+    <p:notesMasterId r:id="rId12"/>
   </p:notesMasterIdLst>
   <p:sldIdLst>
     <p:sldId id="256" r:id="rId2"/>
@@ -14,9 +14,10 @@
     <p:sldId id="267" r:id="rId5"/>
     <p:sldId id="266" r:id="rId6"/>
     <p:sldId id="259" r:id="rId7"/>
-    <p:sldId id="260" r:id="rId8"/>
-    <p:sldId id="261" r:id="rId9"/>
-    <p:sldId id="264" r:id="rId10"/>
+    <p:sldId id="268" r:id="rId8"/>
+    <p:sldId id="260" r:id="rId9"/>
+    <p:sldId id="261" r:id="rId10"/>
+    <p:sldId id="264" r:id="rId11"/>
   </p:sldIdLst>
   <p:sldSz cx="12192000" cy="6858000"/>
   <p:notesSz cx="6858000" cy="9144000"/>
@@ -3997,6 +3998,138 @@
 </p:sld>
 </file>
 
+<file path=ppt/slides/slide10.xml><?xml version="1.0" encoding="utf-8"?>
+<p:sld xmlns:a="http://schemas.openxmlformats.org/drawingml/2006/main" xmlns:r="http://schemas.openxmlformats.org/officeDocument/2006/relationships" xmlns:p="http://schemas.openxmlformats.org/presentationml/2006/main">
+  <p:cSld>
+    <p:spTree>
+      <p:nvGrpSpPr>
+        <p:cNvPr id="1" name=""/>
+        <p:cNvGrpSpPr/>
+        <p:nvPr/>
+      </p:nvGrpSpPr>
+      <p:grpSpPr>
+        <a:xfrm>
+          <a:off x="0" y="0"/>
+          <a:ext cx="0" cy="0"/>
+          <a:chOff x="0" y="0"/>
+          <a:chExt cx="0" cy="0"/>
+        </a:xfrm>
+      </p:grpSpPr>
+      <p:sp>
+        <p:nvSpPr>
+          <p:cNvPr id="2" name="Title 1">
+            <a:extLst>
+              <a:ext uri="{FF2B5EF4-FFF2-40B4-BE49-F238E27FC236}">
+                <a16:creationId xmlns:a16="http://schemas.microsoft.com/office/drawing/2014/main" id="{8ED2E1A2-FDDB-D893-A480-46AE4E4FD86E}"/>
+              </a:ext>
+            </a:extLst>
+          </p:cNvPr>
+          <p:cNvSpPr>
+            <a:spLocks noGrp="1"/>
+          </p:cNvSpPr>
+          <p:nvPr>
+            <p:ph type="title"/>
+          </p:nvPr>
+        </p:nvSpPr>
+        <p:spPr/>
+        <p:txBody>
+          <a:bodyPr/>
+          <a:lstStyle/>
+          <a:p>
+            <a:r>
+              <a:rPr lang="en-US" dirty="0"/>
+              <a:t>Contact Information</a:t>
+            </a:r>
+          </a:p>
+        </p:txBody>
+      </p:sp>
+      <p:sp>
+        <p:nvSpPr>
+          <p:cNvPr id="3" name="Content Placeholder 2">
+            <a:extLst>
+              <a:ext uri="{FF2B5EF4-FFF2-40B4-BE49-F238E27FC236}">
+                <a16:creationId xmlns:a16="http://schemas.microsoft.com/office/drawing/2014/main" id="{5A6FC140-D78F-F615-1845-B3DA8A9E1E7D}"/>
+              </a:ext>
+            </a:extLst>
+          </p:cNvPr>
+          <p:cNvSpPr>
+            <a:spLocks noGrp="1"/>
+          </p:cNvSpPr>
+          <p:nvPr>
+            <p:ph idx="1"/>
+          </p:nvPr>
+        </p:nvSpPr>
+        <p:spPr/>
+        <p:txBody>
+          <a:bodyPr/>
+          <a:lstStyle/>
+          <a:p>
+            <a:r>
+              <a:rPr lang="en-US" dirty="0"/>
+              <a:t>Email: </a:t>
+            </a:r>
+            <a:r>
+              <a:rPr lang="en-US" dirty="0">
+                <a:hlinkClick r:id="rId2"/>
+              </a:rPr>
+              <a:t>Dhruvragunathan@gmail.com</a:t>
+            </a:r>
+            <a:r>
+              <a:rPr lang="en-US" dirty="0"/>
+              <a:t>	</a:t>
+            </a:r>
+          </a:p>
+          <a:p>
+            <a:r>
+              <a:rPr lang="en-US" dirty="0"/>
+              <a:t>LinkedIn: </a:t>
+            </a:r>
+            <a:r>
+              <a:rPr lang="en-US" dirty="0">
+                <a:hlinkClick r:id="rId3"/>
+              </a:rPr>
+              <a:t>https://www.linkedin.com/in/dhruv-ragunathan-908993b1/</a:t>
+            </a:r>
+            <a:r>
+              <a:rPr lang="en-US" dirty="0"/>
+              <a:t> </a:t>
+            </a:r>
+          </a:p>
+          <a:p>
+            <a:r>
+              <a:rPr lang="en-US" dirty="0" err="1"/>
+              <a:t>Github</a:t>
+            </a:r>
+            <a:r>
+              <a:rPr lang="en-US" dirty="0"/>
+              <a:t>: </a:t>
+            </a:r>
+            <a:r>
+              <a:rPr lang="en-US" dirty="0">
+                <a:hlinkClick r:id="rId4"/>
+              </a:rPr>
+              <a:t>https://github.com/dragunat2016/Pneumonia_Image_Detection</a:t>
+            </a:r>
+            <a:r>
+              <a:rPr lang="en-US" dirty="0"/>
+              <a:t> </a:t>
+            </a:r>
+          </a:p>
+        </p:txBody>
+      </p:sp>
+    </p:spTree>
+    <p:extLst>
+      <p:ext uri="{BB962C8B-B14F-4D97-AF65-F5344CB8AC3E}">
+        <p14:creationId xmlns:p14="http://schemas.microsoft.com/office/powerpoint/2010/main" val="86364214"/>
+      </p:ext>
+    </p:extLst>
+  </p:cSld>
+  <p:clrMapOvr>
+    <a:masterClrMapping/>
+  </p:clrMapOvr>
+</p:sld>
+</file>
+
 <file path=ppt/slides/slide2.xml><?xml version="1.0" encoding="utf-8"?>
 <p:sld xmlns:a="http://schemas.openxmlformats.org/drawingml/2006/main" xmlns:r="http://schemas.openxmlformats.org/officeDocument/2006/relationships" xmlns:p="http://schemas.openxmlformats.org/presentationml/2006/main">
   <p:cSld>
@@ -4306,6 +4439,123 @@
           </a:p>
         </p:txBody>
       </p:sp>
+      <p:pic>
+        <p:nvPicPr>
+          <p:cNvPr id="7" name="Picture 6">
+            <a:extLst>
+              <a:ext uri="{FF2B5EF4-FFF2-40B4-BE49-F238E27FC236}">
+                <a16:creationId xmlns:a16="http://schemas.microsoft.com/office/drawing/2014/main" id="{C8319E56-B34A-2DE0-AE49-BA83A8ACE16F}"/>
+              </a:ext>
+            </a:extLst>
+          </p:cNvPr>
+          <p:cNvPicPr>
+            <a:picLocks noChangeAspect="1"/>
+          </p:cNvPicPr>
+          <p:nvPr/>
+        </p:nvPicPr>
+        <p:blipFill>
+          <a:blip r:embed="rId2"/>
+          <a:stretch>
+            <a:fillRect/>
+          </a:stretch>
+        </p:blipFill>
+        <p:spPr>
+          <a:xfrm>
+            <a:off x="2845455" y="2295656"/>
+            <a:ext cx="6963822" cy="2257894"/>
+          </a:xfrm>
+          <a:prstGeom prst="rect">
+            <a:avLst/>
+          </a:prstGeom>
+        </p:spPr>
+      </p:pic>
+      <p:pic>
+        <p:nvPicPr>
+          <p:cNvPr id="8" name="Picture 7">
+            <a:extLst>
+              <a:ext uri="{FF2B5EF4-FFF2-40B4-BE49-F238E27FC236}">
+                <a16:creationId xmlns:a16="http://schemas.microsoft.com/office/drawing/2014/main" id="{FE74300E-C09A-2D75-D80E-042805131DD1}"/>
+              </a:ext>
+            </a:extLst>
+          </p:cNvPr>
+          <p:cNvPicPr>
+            <a:picLocks noChangeAspect="1"/>
+          </p:cNvPicPr>
+          <p:nvPr/>
+        </p:nvPicPr>
+        <p:blipFill rotWithShape="1">
+          <a:blip r:embed="rId3"/>
+          <a:srcRect l="7304" t="6637" b="3067"/>
+          <a:stretch/>
+        </p:blipFill>
+        <p:spPr>
+          <a:xfrm>
+            <a:off x="5389765" y="4649698"/>
+            <a:ext cx="2051050" cy="2037748"/>
+          </a:xfrm>
+          <a:prstGeom prst="rect">
+            <a:avLst/>
+          </a:prstGeom>
+        </p:spPr>
+      </p:pic>
+      <p:pic>
+        <p:nvPicPr>
+          <p:cNvPr id="9" name="Picture 8">
+            <a:extLst>
+              <a:ext uri="{FF2B5EF4-FFF2-40B4-BE49-F238E27FC236}">
+                <a16:creationId xmlns:a16="http://schemas.microsoft.com/office/drawing/2014/main" id="{009C653A-7B5F-B136-19C7-D4B7E3AD14D5}"/>
+              </a:ext>
+            </a:extLst>
+          </p:cNvPr>
+          <p:cNvPicPr>
+            <a:picLocks noChangeAspect="1"/>
+          </p:cNvPicPr>
+          <p:nvPr/>
+        </p:nvPicPr>
+        <p:blipFill rotWithShape="1">
+          <a:blip r:embed="rId4"/>
+          <a:srcRect l="5262" b="4558"/>
+          <a:stretch/>
+        </p:blipFill>
+        <p:spPr>
+          <a:xfrm>
+            <a:off x="7617551" y="4587739"/>
+            <a:ext cx="2051050" cy="2066279"/>
+          </a:xfrm>
+          <a:prstGeom prst="rect">
+            <a:avLst/>
+          </a:prstGeom>
+        </p:spPr>
+      </p:pic>
+      <p:pic>
+        <p:nvPicPr>
+          <p:cNvPr id="10" name="Picture 9">
+            <a:extLst>
+              <a:ext uri="{FF2B5EF4-FFF2-40B4-BE49-F238E27FC236}">
+                <a16:creationId xmlns:a16="http://schemas.microsoft.com/office/drawing/2014/main" id="{663E8AC5-9552-CD5C-BD2B-444768681748}"/>
+              </a:ext>
+            </a:extLst>
+          </p:cNvPr>
+          <p:cNvPicPr>
+            <a:picLocks noChangeAspect="1"/>
+          </p:cNvPicPr>
+          <p:nvPr/>
+        </p:nvPicPr>
+        <p:blipFill rotWithShape="1">
+          <a:blip r:embed="rId5"/>
+          <a:srcRect b="-842"/>
+          <a:stretch/>
+        </p:blipFill>
+        <p:spPr>
+          <a:xfrm>
+            <a:off x="3048000" y="4562344"/>
+            <a:ext cx="2051050" cy="2037748"/>
+          </a:xfrm>
+          <a:prstGeom prst="rect">
+            <a:avLst/>
+          </a:prstGeom>
+        </p:spPr>
+      </p:pic>
     </p:spTree>
     <p:extLst>
       <p:ext uri="{BB962C8B-B14F-4D97-AF65-F5344CB8AC3E}">
@@ -4536,13 +4786,8 @@
           <a:p>
             <a:r>
               <a:rPr lang="en-US" dirty="0"/>
-              <a:t>Since recall is more important than accuracy, we are </a:t>
-            </a:r>
-            <a:r>
-              <a:rPr lang="en-US"/>
-              <a:t>selecting model 4.</a:t>
-            </a:r>
-            <a:endParaRPr lang="en-US" dirty="0"/>
+              <a:t>Since recall is more important than accuracy, we are selecting model 4.</a:t>
+            </a:r>
           </a:p>
           <a:p>
             <a:pPr marL="0" indent="0">
@@ -4658,78 +4903,56 @@
             <p:ph type="title"/>
           </p:nvPr>
         </p:nvSpPr>
-        <p:spPr/>
+        <p:spPr>
+          <a:xfrm>
+            <a:off x="2310504" y="335582"/>
+            <a:ext cx="7729728" cy="1188720"/>
+          </a:xfrm>
+        </p:spPr>
         <p:txBody>
           <a:bodyPr/>
           <a:lstStyle/>
           <a:p>
             <a:r>
               <a:rPr lang="en-US" dirty="0"/>
-              <a:t>Recommendations</a:t>
-            </a:r>
-          </a:p>
-        </p:txBody>
-      </p:sp>
-      <p:sp>
-        <p:nvSpPr>
-          <p:cNvPr id="3" name="Content Placeholder 2">
+              <a:t>Model Results – Confusion Matrix</a:t>
+            </a:r>
+          </a:p>
+        </p:txBody>
+      </p:sp>
+      <p:pic>
+        <p:nvPicPr>
+          <p:cNvPr id="8" name="Picture 7">
             <a:extLst>
               <a:ext uri="{FF2B5EF4-FFF2-40B4-BE49-F238E27FC236}">
-                <a16:creationId xmlns:a16="http://schemas.microsoft.com/office/drawing/2014/main" id="{5A6FC140-D78F-F615-1845-B3DA8A9E1E7D}"/>
+                <a16:creationId xmlns:a16="http://schemas.microsoft.com/office/drawing/2014/main" id="{23CB33F6-EF51-3EA6-0236-57865B566DE0}"/>
               </a:ext>
             </a:extLst>
           </p:cNvPr>
-          <p:cNvSpPr>
-            <a:spLocks noGrp="1"/>
-          </p:cNvSpPr>
-          <p:nvPr>
-            <p:ph idx="1"/>
-          </p:nvPr>
-        </p:nvSpPr>
-        <p:spPr/>
-        <p:txBody>
-          <a:bodyPr>
-            <a:normAutofit/>
-          </a:bodyPr>
-          <a:lstStyle/>
-          <a:p>
-            <a:r>
-              <a:rPr lang="en-US" dirty="0"/>
-              <a:t>Recommend that you move forward with using the final model since it had the highest recall by 3% and only was 1% less accurate than the other models. </a:t>
-            </a:r>
-          </a:p>
-          <a:p>
-            <a:r>
-              <a:rPr lang="en-US" dirty="0"/>
-              <a:t>Further research on how to operationalize this model in hospital workflows. Examples:</a:t>
-            </a:r>
-          </a:p>
-          <a:p>
-            <a:pPr lvl="1"/>
-            <a:r>
-              <a:rPr lang="en-US" dirty="0"/>
-              <a:t>How are false positives and negatives handled in a hospital? </a:t>
-            </a:r>
-          </a:p>
-          <a:p>
-            <a:pPr lvl="1"/>
-            <a:r>
-              <a:rPr lang="en-US" dirty="0"/>
-              <a:t>Is there a method for clinicians to quickly determine that the patient does not have pneumonia?</a:t>
-            </a:r>
-          </a:p>
-          <a:p>
-            <a:r>
-              <a:rPr lang="en-US" dirty="0"/>
-              <a:t>Training on larger and more diverse data sets is necessary before it’s deployed. </a:t>
-            </a:r>
-          </a:p>
-        </p:txBody>
-      </p:sp>
+          <p:cNvPicPr>
+            <a:picLocks noChangeAspect="1"/>
+          </p:cNvPicPr>
+          <p:nvPr/>
+        </p:nvPicPr>
+        <p:blipFill rotWithShape="1">
+          <a:blip r:embed="rId2"/>
+          <a:srcRect l="1236" r="13833" b="699"/>
+          <a:stretch/>
+        </p:blipFill>
+        <p:spPr>
+          <a:xfrm>
+            <a:off x="2907323" y="1711569"/>
+            <a:ext cx="5533291" cy="4994031"/>
+          </a:xfrm>
+          <a:prstGeom prst="rect">
+            <a:avLst/>
+          </a:prstGeom>
+        </p:spPr>
+      </p:pic>
     </p:spTree>
     <p:extLst>
       <p:ext uri="{BB962C8B-B14F-4D97-AF65-F5344CB8AC3E}">
-        <p14:creationId xmlns:p14="http://schemas.microsoft.com/office/powerpoint/2010/main" val="809386630"/>
+        <p14:creationId xmlns:p14="http://schemas.microsoft.com/office/powerpoint/2010/main" val="500597836"/>
       </p:ext>
     </p:extLst>
   </p:cSld>
@@ -4779,7 +5002,7 @@
           <a:p>
             <a:r>
               <a:rPr lang="en-US" dirty="0"/>
-              <a:t>Future Projects</a:t>
+              <a:t>Recommendations</a:t>
             </a:r>
           </a:p>
         </p:txBody>
@@ -4802,61 +5025,48 @@
         </p:nvSpPr>
         <p:spPr/>
         <p:txBody>
-          <a:bodyPr/>
+          <a:bodyPr>
+            <a:normAutofit/>
+          </a:bodyPr>
           <a:lstStyle/>
           <a:p>
             <a:r>
               <a:rPr lang="en-US" dirty="0"/>
-              <a:t>Aggregate significantly more lung data across groups off different ages.</a:t>
-            </a:r>
-          </a:p>
-          <a:p>
-            <a:pPr marL="0" indent="0">
-              <a:buNone/>
-            </a:pPr>
-            <a:endParaRPr lang="en-US" dirty="0"/>
+              <a:t>Recommend that you move forward with using the final model since it had the highest recall by 3% and only was 1% less accurate than the other models. </a:t>
+            </a:r>
           </a:p>
           <a:p>
             <a:r>
               <a:rPr lang="en-US" dirty="0"/>
-              <a:t>Enhance the model by allowing it too identify bacterial and viral pneumonia.</a:t>
-            </a:r>
-          </a:p>
-          <a:p>
-            <a:pPr marL="0" indent="0">
-              <a:buNone/>
-            </a:pPr>
-            <a:endParaRPr lang="en-US" dirty="0"/>
-          </a:p>
-          <a:p>
+              <a:t>Further research on how to operationalize this model in hospital workflows. Examples:</a:t>
+            </a:r>
+          </a:p>
+          <a:p>
+            <a:pPr lvl="1"/>
             <a:r>
               <a:rPr lang="en-US" dirty="0"/>
-              <a:t>Deploy the model in a small hospital. Observe the following:</a:t>
+              <a:t>How are false positives and negatives handled in a hospital? </a:t>
             </a:r>
           </a:p>
           <a:p>
             <a:pPr lvl="1"/>
             <a:r>
               <a:rPr lang="en-US" dirty="0"/>
-              <a:t>Record time saved by radiologists</a:t>
-            </a:r>
-          </a:p>
-          <a:p>
-            <a:pPr lvl="1"/>
+              <a:t>Is there a method for clinicians to quickly determine that the patient does not have pneumonia?</a:t>
+            </a:r>
+          </a:p>
+          <a:p>
             <a:r>
               <a:rPr lang="en-US" dirty="0"/>
-              <a:t>impact of false positives on clinician workflows.</a:t>
-            </a:r>
-          </a:p>
-          <a:p>
-            <a:endParaRPr lang="en-US" dirty="0"/>
+              <a:t>Training on larger and more diverse data sets is necessary before it’s deployed. </a:t>
+            </a:r>
           </a:p>
         </p:txBody>
       </p:sp>
     </p:spTree>
     <p:extLst>
       <p:ext uri="{BB962C8B-B14F-4D97-AF65-F5344CB8AC3E}">
-        <p14:creationId xmlns:p14="http://schemas.microsoft.com/office/powerpoint/2010/main" val="1049255770"/>
+        <p14:creationId xmlns:p14="http://schemas.microsoft.com/office/powerpoint/2010/main" val="809386630"/>
       </p:ext>
     </p:extLst>
   </p:cSld>
@@ -4906,7 +5116,7 @@
           <a:p>
             <a:r>
               <a:rPr lang="en-US" dirty="0"/>
-              <a:t>Contact Information</a:t>
+              <a:t>Future Projects</a:t>
             </a:r>
           </a:p>
         </p:txBody>
@@ -4934,61 +5144,56 @@
           <a:p>
             <a:r>
               <a:rPr lang="en-US" dirty="0"/>
-              <a:t>Email: </a:t>
-            </a:r>
-            <a:r>
-              <a:rPr lang="en-US" dirty="0">
-                <a:hlinkClick r:id="rId2"/>
-              </a:rPr>
-              <a:t>Dhruvragunathan@gmail.com</a:t>
-            </a:r>
+              <a:t>Aggregate significantly more lung data across groups off different ages.</a:t>
+            </a:r>
+          </a:p>
+          <a:p>
+            <a:pPr marL="0" indent="0">
+              <a:buNone/>
+            </a:pPr>
+            <a:endParaRPr lang="en-US" dirty="0"/>
+          </a:p>
+          <a:p>
             <a:r>
               <a:rPr lang="en-US" dirty="0"/>
-              <a:t>	</a:t>
-            </a:r>
+              <a:t>Enhance the model by allowing it too identify bacterial and viral pneumonia.</a:t>
+            </a:r>
+          </a:p>
+          <a:p>
+            <a:pPr marL="0" indent="0">
+              <a:buNone/>
+            </a:pPr>
+            <a:endParaRPr lang="en-US" dirty="0"/>
           </a:p>
           <a:p>
             <a:r>
               <a:rPr lang="en-US" dirty="0"/>
-              <a:t>LinkedIn: </a:t>
-            </a:r>
-            <a:r>
-              <a:rPr lang="en-US" dirty="0">
-                <a:hlinkClick r:id="rId3"/>
-              </a:rPr>
-              <a:t>https://www.linkedin.com/in/dhruv-ragunathan-908993b1/</a:t>
-            </a:r>
+              <a:t>Deploy the model in a small hospital. Observe the following:</a:t>
+            </a:r>
+          </a:p>
+          <a:p>
+            <a:pPr lvl="1"/>
             <a:r>
               <a:rPr lang="en-US" dirty="0"/>
-              <a:t> </a:t>
-            </a:r>
-          </a:p>
-          <a:p>
-            <a:r>
-              <a:rPr lang="en-US" dirty="0" err="1"/>
-              <a:t>Github</a:t>
-            </a:r>
+              <a:t>Record time saved by radiologists</a:t>
+            </a:r>
+          </a:p>
+          <a:p>
+            <a:pPr lvl="1"/>
             <a:r>
               <a:rPr lang="en-US" dirty="0"/>
-              <a:t>: </a:t>
-            </a:r>
-            <a:r>
-              <a:rPr lang="en-US" dirty="0">
-                <a:hlinkClick r:id="rId4"/>
-              </a:rPr>
-              <a:t>https://github.com/dragunat2016/Pneumonia_Image_Detection</a:t>
-            </a:r>
-            <a:r>
-              <a:rPr lang="en-US" dirty="0"/>
-              <a:t> </a:t>
-            </a:r>
+              <a:t>impact of false positives on clinician workflows.</a:t>
+            </a:r>
+          </a:p>
+          <a:p>
+            <a:endParaRPr lang="en-US" dirty="0"/>
           </a:p>
         </p:txBody>
       </p:sp>
     </p:spTree>
     <p:extLst>
       <p:ext uri="{BB962C8B-B14F-4D97-AF65-F5344CB8AC3E}">
-        <p14:creationId xmlns:p14="http://schemas.microsoft.com/office/powerpoint/2010/main" val="86364214"/>
+        <p14:creationId xmlns:p14="http://schemas.microsoft.com/office/powerpoint/2010/main" val="1049255770"/>
       </p:ext>
     </p:extLst>
   </p:cSld>

</xml_diff>

<commit_message>
Added some more info to presentation
</commit_message>
<xml_diff>
--- a/Presentation/Presentation.pptx
+++ b/Presentation/Presentation.pptx
@@ -206,7 +206,7 @@
           <a:p>
             <a:fld id="{43ED6E17-E11D-A343-9986-A8209C37F2E4}" type="datetimeFigureOut">
               <a:rPr lang="en-US" smtClean="0"/>
-              <a:t>11/16/23</a:t>
+              <a:t>11/17/23</a:t>
             </a:fld>
             <a:endParaRPr lang="en-US"/>
           </a:p>
@@ -904,7 +904,7 @@
           <a:p>
             <a:fld id="{C245FD1E-F56D-0E4D-8B29-731D998991B5}" type="datetimeFigureOut">
               <a:rPr lang="en-US" smtClean="0"/>
-              <a:t>11/16/23</a:t>
+              <a:t>11/17/23</a:t>
             </a:fld>
             <a:endParaRPr lang="en-US"/>
           </a:p>
@@ -1074,7 +1074,7 @@
           <a:p>
             <a:fld id="{C245FD1E-F56D-0E4D-8B29-731D998991B5}" type="datetimeFigureOut">
               <a:rPr lang="en-US" smtClean="0"/>
-              <a:t>11/16/23</a:t>
+              <a:t>11/17/23</a:t>
             </a:fld>
             <a:endParaRPr lang="en-US"/>
           </a:p>
@@ -1254,7 +1254,7 @@
           <a:p>
             <a:fld id="{C245FD1E-F56D-0E4D-8B29-731D998991B5}" type="datetimeFigureOut">
               <a:rPr lang="en-US" smtClean="0"/>
-              <a:t>11/16/23</a:t>
+              <a:t>11/17/23</a:t>
             </a:fld>
             <a:endParaRPr lang="en-US"/>
           </a:p>
@@ -1424,7 +1424,7 @@
           <a:p>
             <a:fld id="{C245FD1E-F56D-0E4D-8B29-731D998991B5}" type="datetimeFigureOut">
               <a:rPr lang="en-US" smtClean="0"/>
-              <a:t>11/16/23</a:t>
+              <a:t>11/17/23</a:t>
             </a:fld>
             <a:endParaRPr lang="en-US"/>
           </a:p>
@@ -1692,7 +1692,7 @@
           <a:p>
             <a:fld id="{C245FD1E-F56D-0E4D-8B29-731D998991B5}" type="datetimeFigureOut">
               <a:rPr lang="en-US" smtClean="0"/>
-              <a:t>11/16/23</a:t>
+              <a:t>11/17/23</a:t>
             </a:fld>
             <a:endParaRPr lang="en-US"/>
           </a:p>
@@ -1924,7 +1924,7 @@
           <a:p>
             <a:fld id="{C245FD1E-F56D-0E4D-8B29-731D998991B5}" type="datetimeFigureOut">
               <a:rPr lang="en-US" smtClean="0"/>
-              <a:t>11/16/23</a:t>
+              <a:t>11/17/23</a:t>
             </a:fld>
             <a:endParaRPr lang="en-US"/>
           </a:p>
@@ -2283,7 +2283,7 @@
           <a:p>
             <a:fld id="{C245FD1E-F56D-0E4D-8B29-731D998991B5}" type="datetimeFigureOut">
               <a:rPr lang="en-US" smtClean="0"/>
-              <a:t>11/16/23</a:t>
+              <a:t>11/17/23</a:t>
             </a:fld>
             <a:endParaRPr lang="en-US"/>
           </a:p>
@@ -2424,7 +2424,7 @@
           <a:p>
             <a:fld id="{C245FD1E-F56D-0E4D-8B29-731D998991B5}" type="datetimeFigureOut">
               <a:rPr lang="en-US" smtClean="0"/>
-              <a:t>11/16/23</a:t>
+              <a:t>11/17/23</a:t>
             </a:fld>
             <a:endParaRPr lang="en-US"/>
           </a:p>
@@ -2519,7 +2519,7 @@
           <a:p>
             <a:fld id="{C245FD1E-F56D-0E4D-8B29-731D998991B5}" type="datetimeFigureOut">
               <a:rPr lang="en-US" smtClean="0"/>
-              <a:t>11/16/23</a:t>
+              <a:t>11/17/23</a:t>
             </a:fld>
             <a:endParaRPr lang="en-US"/>
           </a:p>
@@ -2876,7 +2876,7 @@
           <a:p>
             <a:fld id="{C245FD1E-F56D-0E4D-8B29-731D998991B5}" type="datetimeFigureOut">
               <a:rPr lang="en-US" smtClean="0"/>
-              <a:t>11/16/23</a:t>
+              <a:t>11/17/23</a:t>
             </a:fld>
             <a:endParaRPr lang="en-US"/>
           </a:p>
@@ -3233,7 +3233,7 @@
           <a:p>
             <a:fld id="{C245FD1E-F56D-0E4D-8B29-731D998991B5}" type="datetimeFigureOut">
               <a:rPr lang="en-US" smtClean="0"/>
-              <a:t>11/16/23</a:t>
+              <a:t>11/17/23</a:t>
             </a:fld>
             <a:endParaRPr lang="en-US"/>
           </a:p>
@@ -3475,7 +3475,7 @@
           <a:p>
             <a:fld id="{C245FD1E-F56D-0E4D-8B29-731D998991B5}" type="datetimeFigureOut">
               <a:rPr lang="en-US" smtClean="0"/>
-              <a:t>11/16/23</a:t>
+              <a:t>11/17/23</a:t>
             </a:fld>
             <a:endParaRPr lang="en-US"/>
           </a:p>
@@ -4205,11 +4205,8 @@
           <a:p>
             <a:r>
               <a:rPr lang="en-US" dirty="0"/>
-              <a:t>We have been tasked to improve identification of pneumonia.</a:t>
-            </a:r>
-          </a:p>
-          <a:p>
-            <a:endParaRPr lang="en-US" dirty="0"/>
+              <a:t>We have been tasked to improve identification of pneumonia by the CIO.</a:t>
+            </a:r>
           </a:p>
           <a:p>
             <a:r>
@@ -4936,19 +4933,97 @@
         </p:nvPicPr>
         <p:blipFill rotWithShape="1">
           <a:blip r:embed="rId2"/>
-          <a:srcRect l="1236" r="13833" b="699"/>
+          <a:srcRect l="5821" r="16725" b="7657"/>
           <a:stretch/>
         </p:blipFill>
         <p:spPr>
           <a:xfrm>
-            <a:off x="2907323" y="1711569"/>
-            <a:ext cx="5533291" cy="4994031"/>
+            <a:off x="1478844" y="1775069"/>
+            <a:ext cx="5046134" cy="4644075"/>
           </a:xfrm>
           <a:prstGeom prst="rect">
             <a:avLst/>
           </a:prstGeom>
         </p:spPr>
       </p:pic>
+      <p:sp>
+        <p:nvSpPr>
+          <p:cNvPr id="3" name="TextBox 2">
+            <a:extLst>
+              <a:ext uri="{FF2B5EF4-FFF2-40B4-BE49-F238E27FC236}">
+                <a16:creationId xmlns:a16="http://schemas.microsoft.com/office/drawing/2014/main" id="{CA73CC2B-8027-C155-C359-B24B7D049DC3}"/>
+              </a:ext>
+            </a:extLst>
+          </p:cNvPr>
+          <p:cNvSpPr txBox="1"/>
+          <p:nvPr/>
+        </p:nvSpPr>
+        <p:spPr>
+          <a:xfrm>
+            <a:off x="6769100" y="1866900"/>
+            <a:ext cx="4762500" cy="3139321"/>
+          </a:xfrm>
+          <a:prstGeom prst="rect">
+            <a:avLst/>
+          </a:prstGeom>
+          <a:noFill/>
+        </p:spPr>
+        <p:txBody>
+          <a:bodyPr wrap="square" rtlCol="0">
+            <a:spAutoFit/>
+          </a:bodyPr>
+          <a:lstStyle/>
+          <a:p>
+            <a:pPr marL="285750" indent="-285750">
+              <a:buFont typeface="Arial" panose="020B0604020202020204" pitchFamily="34" charset="0"/>
+              <a:buChar char="•"/>
+            </a:pPr>
+            <a:r>
+              <a:rPr lang="en-US" dirty="0"/>
+              <a:t>Model correctly identified 2,100 lungs with pneumonia</a:t>
+            </a:r>
+          </a:p>
+          <a:p>
+            <a:endParaRPr lang="en-US" dirty="0"/>
+          </a:p>
+          <a:p>
+            <a:pPr marL="285750" indent="-285750">
+              <a:buFont typeface="Arial" panose="020B0604020202020204" pitchFamily="34" charset="0"/>
+              <a:buChar char="•"/>
+            </a:pPr>
+            <a:r>
+              <a:rPr lang="en-US" dirty="0"/>
+              <a:t>Model correctly identified 720 lungs without pneumonia.</a:t>
+            </a:r>
+          </a:p>
+          <a:p>
+            <a:endParaRPr lang="en-US" dirty="0"/>
+          </a:p>
+          <a:p>
+            <a:pPr marL="285750" indent="-285750">
+              <a:buFont typeface="Arial" panose="020B0604020202020204" pitchFamily="34" charset="0"/>
+              <a:buChar char="•"/>
+            </a:pPr>
+            <a:r>
+              <a:rPr lang="en-US" dirty="0"/>
+              <a:t>Model incorrectly identified 96 normal lungs as having pneumonia.</a:t>
+            </a:r>
+          </a:p>
+          <a:p>
+            <a:endParaRPr lang="en-US" dirty="0"/>
+          </a:p>
+          <a:p>
+            <a:pPr marL="285750" indent="-285750">
+              <a:buFont typeface="Arial" panose="020B0604020202020204" pitchFamily="34" charset="0"/>
+              <a:buChar char="•"/>
+            </a:pPr>
+            <a:r>
+              <a:rPr lang="en-US" dirty="0"/>
+              <a:t>Model incorrectly identified 60 pneumatic lungs as if they had pneumonia.</a:t>
+            </a:r>
+          </a:p>
+        </p:txBody>
+      </p:sp>
     </p:spTree>
     <p:extLst>
       <p:ext uri="{BB962C8B-B14F-4D97-AF65-F5344CB8AC3E}">

</xml_diff>